<commit_message>
updated MCMC mean rate plot
</commit_message>
<xml_diff>
--- a/presentation/Fred_Berendse_poster_draft.pptx
+++ b/presentation/Fred_Berendse_poster_draft.pptx
@@ -239,7 +239,7 @@
           </a:bodyPr>
           <a:p>
             <a:pPr algn="r"/>
-            <a:fld id="{F18017B2-209E-46B4-8ECB-09E01D2EE98C}" type="slidenum">
+            <a:fld id="{B6C0F865-424B-46A9-A667-05AA100337E3}" type="slidenum">
               <a:rPr b="0" lang="en-US" sz="1400" spc="-1" strike="noStrike">
                 <a:latin typeface="Times New Roman"/>
               </a:rPr>
@@ -276,14 +276,14 @@
       </p:grpSpPr>
       <p:sp>
         <p:nvSpPr>
-          <p:cNvPr id="102" name="CustomShape 1"/>
+          <p:cNvPr id="104" name="CustomShape 1"/>
           <p:cNvSpPr/>
           <p:nvPr/>
         </p:nvSpPr>
         <p:spPr>
           <a:xfrm>
             <a:off x="3884760" y="8685360"/>
-            <a:ext cx="2970720" cy="456120"/>
+            <a:ext cx="2970360" cy="455760"/>
           </a:xfrm>
           <a:prstGeom prst="rect">
             <a:avLst/>
@@ -309,14 +309,14 @@
                 <a:spcPct val="100000"/>
               </a:lnSpc>
             </a:pPr>
-            <a:fld id="{FF90A00C-1115-43B9-9CF7-626791F37AE5}" type="slidenum">
+            <a:fld id="{1BF90776-9083-4C5A-BA61-63CE1955CF1A}" type="slidenum">
               <a:rPr b="0" lang="en-US" sz="1200" spc="-1" strike="noStrike">
                 <a:solidFill>
                   <a:srgbClr val="000000"/>
                 </a:solidFill>
                 <a:latin typeface="Arial"/>
               </a:rPr>
-              <a:t>&lt;number&gt;</a:t>
+              <a:t>1</a:t>
             </a:fld>
             <a:endParaRPr b="0" lang="en-US" sz="1200" spc="-1" strike="noStrike">
               <a:latin typeface="Arial"/>
@@ -326,7 +326,7 @@
       </p:sp>
       <p:sp>
         <p:nvSpPr>
-          <p:cNvPr id="103" name="PlaceHolder 2"/>
+          <p:cNvPr id="105" name="PlaceHolder 2"/>
           <p:cNvSpPr>
             <a:spLocks noGrp="1"/>
           </p:cNvSpPr>
@@ -337,16 +337,16 @@
         <p:spPr>
           <a:xfrm>
             <a:off x="1143000" y="685800"/>
-            <a:ext cx="4570920" cy="3427920"/>
-          </a:xfrm>
-          <a:prstGeom prst="rect">
-            <a:avLst/>
-          </a:prstGeom>
-        </p:spPr>
-      </p:sp>
-      <p:sp>
-        <p:nvSpPr>
-          <p:cNvPr id="104" name="PlaceHolder 3"/>
+            <a:ext cx="4570560" cy="3427560"/>
+          </a:xfrm>
+          <a:prstGeom prst="rect">
+            <a:avLst/>
+          </a:prstGeom>
+        </p:spPr>
+      </p:sp>
+      <p:sp>
+        <p:nvSpPr>
+          <p:cNvPr id="106" name="PlaceHolder 3"/>
           <p:cNvSpPr>
             <a:spLocks noGrp="1"/>
           </p:cNvSpPr>
@@ -357,7 +357,7 @@
         <p:spPr>
           <a:xfrm>
             <a:off x="685800" y="4343400"/>
-            <a:ext cx="5485320" cy="4113720"/>
+            <a:ext cx="5484960" cy="4113360"/>
           </a:xfrm>
           <a:prstGeom prst="rect">
             <a:avLst/>
@@ -1771,8 +1771,8 @@
         </p:blipFill>
         <p:spPr>
           <a:xfrm rot="16200000">
-            <a:off x="-9245520" y="16460280"/>
-            <a:ext cx="15365880" cy="1560960"/>
+            <a:off x="-9245520" y="16460640"/>
+            <a:ext cx="15365520" cy="1560600"/>
           </a:xfrm>
           <a:prstGeom prst="rect">
             <a:avLst/>
@@ -1794,8 +1794,8 @@
         </p:blipFill>
         <p:spPr>
           <a:xfrm rot="5400000">
-            <a:off x="37770840" y="16459200"/>
-            <a:ext cx="15365880" cy="1560960"/>
+            <a:off x="37771200" y="16459200"/>
+            <a:ext cx="15365520" cy="1560600"/>
           </a:xfrm>
           <a:prstGeom prst="rect">
             <a:avLst/>
@@ -1818,7 +1818,7 @@
         <p:spPr>
           <a:xfrm>
             <a:off x="57240" y="33426360"/>
-            <a:ext cx="43776000" cy="2018160"/>
+            <a:ext cx="43775640" cy="2017800"/>
           </a:xfrm>
           <a:prstGeom prst="rect">
             <a:avLst/>
@@ -1837,7 +1837,7 @@
         <p:spPr>
           <a:xfrm>
             <a:off x="57240" y="33998040"/>
-            <a:ext cx="21944520" cy="1269000"/>
+            <a:ext cx="21944160" cy="1268640"/>
           </a:xfrm>
           <a:prstGeom prst="rect">
             <a:avLst/>
@@ -1916,49 +1916,7 @@
               <a:rPr b="0" lang="en-US" sz="4400" spc="-1" strike="noStrike">
                 <a:latin typeface="Arial"/>
               </a:rPr>
-              <a:t>Clic</a:t>
-            </a:r>
-            <a:r>
-              <a:rPr b="0" lang="en-US" sz="4400" spc="-1" strike="noStrike">
-                <a:latin typeface="Arial"/>
-              </a:rPr>
-              <a:t>k to </a:t>
-            </a:r>
-            <a:r>
-              <a:rPr b="0" lang="en-US" sz="4400" spc="-1" strike="noStrike">
-                <a:latin typeface="Arial"/>
-              </a:rPr>
-              <a:t>edit </a:t>
-            </a:r>
-            <a:r>
-              <a:rPr b="0" lang="en-US" sz="4400" spc="-1" strike="noStrike">
-                <a:latin typeface="Arial"/>
-              </a:rPr>
-              <a:t>the </a:t>
-            </a:r>
-            <a:r>
-              <a:rPr b="0" lang="en-US" sz="4400" spc="-1" strike="noStrike">
-                <a:latin typeface="Arial"/>
-              </a:rPr>
-              <a:t>title </a:t>
-            </a:r>
-            <a:r>
-              <a:rPr b="0" lang="en-US" sz="4400" spc="-1" strike="noStrike">
-                <a:latin typeface="Arial"/>
-              </a:rPr>
-              <a:t>text </a:t>
-            </a:r>
-            <a:r>
-              <a:rPr b="0" lang="en-US" sz="4400" spc="-1" strike="noStrike">
-                <a:latin typeface="Arial"/>
-              </a:rPr>
-              <a:t>for</a:t>
-            </a:r>
-            <a:r>
-              <a:rPr b="0" lang="en-US" sz="4400" spc="-1" strike="noStrike">
-                <a:latin typeface="Arial"/>
-              </a:rPr>
-              <a:t>mat</a:t>
+              <a:t>Click to edit the title text format</a:t>
             </a:r>
             <a:endParaRPr b="0" lang="en-US" sz="4400" spc="-1" strike="noStrike">
               <a:latin typeface="Arial"/>
@@ -2191,7 +2149,7 @@
         <p:spPr>
           <a:xfrm>
             <a:off x="68400" y="76320"/>
-            <a:ext cx="43729920" cy="3885120"/>
+            <a:ext cx="43729560" cy="3884760"/>
           </a:xfrm>
           <a:prstGeom prst="rect">
             <a:avLst/>
@@ -2267,7 +2225,7 @@
         <p:spPr>
           <a:xfrm>
             <a:off x="0" y="4343400"/>
-            <a:ext cx="10357200" cy="1027800"/>
+            <a:ext cx="10356840" cy="1027440"/>
           </a:xfrm>
           <a:prstGeom prst="rect">
             <a:avLst/>
@@ -2323,7 +2281,7 @@
         <p:spPr>
           <a:xfrm>
             <a:off x="0" y="11179080"/>
-            <a:ext cx="10357200" cy="1027800"/>
+            <a:ext cx="10356840" cy="1027440"/>
           </a:xfrm>
           <a:prstGeom prst="rect">
             <a:avLst/>
@@ -2379,7 +2337,7 @@
         <p:spPr>
           <a:xfrm>
             <a:off x="11177640" y="4343400"/>
-            <a:ext cx="10357200" cy="1027800"/>
+            <a:ext cx="10356840" cy="1027440"/>
           </a:xfrm>
           <a:prstGeom prst="rect">
             <a:avLst/>
@@ -2435,7 +2393,7 @@
         <p:spPr>
           <a:xfrm>
             <a:off x="22355280" y="4343400"/>
-            <a:ext cx="10357200" cy="1027800"/>
+            <a:ext cx="10356840" cy="1027440"/>
           </a:xfrm>
           <a:prstGeom prst="rect">
             <a:avLst/>
@@ -2491,7 +2449,7 @@
         <p:spPr>
           <a:xfrm>
             <a:off x="22131360" y="27592920"/>
-            <a:ext cx="10368360" cy="1027800"/>
+            <a:ext cx="10368000" cy="1027440"/>
           </a:xfrm>
           <a:prstGeom prst="rect">
             <a:avLst/>
@@ -2547,7 +2505,7 @@
         <p:spPr>
           <a:xfrm>
             <a:off x="33284160" y="17373600"/>
-            <a:ext cx="10357200" cy="1027800"/>
+            <a:ext cx="10356840" cy="1027440"/>
           </a:xfrm>
           <a:prstGeom prst="rect">
             <a:avLst/>
@@ -2603,7 +2561,7 @@
         <p:spPr>
           <a:xfrm>
             <a:off x="33442560" y="27140400"/>
-            <a:ext cx="10357200" cy="1027800"/>
+            <a:ext cx="10356840" cy="1027440"/>
           </a:xfrm>
           <a:prstGeom prst="rect">
             <a:avLst/>
@@ -2659,7 +2617,7 @@
         <p:spPr>
           <a:xfrm>
             <a:off x="0" y="17695080"/>
-            <a:ext cx="10357200" cy="1027800"/>
+            <a:ext cx="10356840" cy="1027440"/>
           </a:xfrm>
           <a:prstGeom prst="rect">
             <a:avLst/>
@@ -2715,7 +2673,7 @@
         <p:spPr>
           <a:xfrm>
             <a:off x="711360" y="5715000"/>
-            <a:ext cx="9447840" cy="5257800"/>
+            <a:ext cx="9447480" cy="5257800"/>
           </a:xfrm>
           <a:prstGeom prst="rect">
             <a:avLst/>
@@ -2769,7 +2727,7 @@
         <p:spPr>
           <a:xfrm>
             <a:off x="11277720" y="5715000"/>
-            <a:ext cx="10210320" cy="1684440"/>
+            <a:ext cx="10209960" cy="1684080"/>
           </a:xfrm>
           <a:prstGeom prst="rect">
             <a:avLst/>
@@ -2790,7 +2748,7 @@
             <a:spAutoFit/>
           </a:bodyPr>
           <a:p>
-            <a:pPr marL="216000" indent="-215640">
+            <a:pPr marL="216000" indent="-215280">
               <a:lnSpc>
                 <a:spcPct val="100000"/>
               </a:lnSpc>
@@ -2851,7 +2809,7 @@
         <p:spPr>
           <a:xfrm>
             <a:off x="-349200" y="11927880"/>
-            <a:ext cx="9955800" cy="5459400"/>
+            <a:ext cx="9955440" cy="5459400"/>
           </a:xfrm>
           <a:prstGeom prst="rect">
             <a:avLst/>
@@ -2885,7 +2843,7 @@
             </a:endParaRPr>
           </a:p>
           <a:p>
-            <a:pPr lvl="1" marL="1271520" indent="-413280">
+            <a:pPr lvl="1" marL="1271520" indent="-412920">
               <a:lnSpc>
                 <a:spcPct val="100000"/>
               </a:lnSpc>
@@ -2913,7 +2871,7 @@
             </a:endParaRPr>
           </a:p>
           <a:p>
-            <a:pPr lvl="1" marL="1271520" indent="-413280">
+            <a:pPr lvl="1" marL="1271520" indent="-412920">
               <a:lnSpc>
                 <a:spcPct val="100000"/>
               </a:lnSpc>
@@ -2951,7 +2909,7 @@
         <p:spPr>
           <a:xfrm>
             <a:off x="33467040" y="18653760"/>
-            <a:ext cx="9965520" cy="1899720"/>
+            <a:ext cx="9965160" cy="1899720"/>
           </a:xfrm>
           <a:prstGeom prst="rect">
             <a:avLst/>
@@ -3002,7 +2960,7 @@
         <p:spPr>
           <a:xfrm>
             <a:off x="22302000" y="12877200"/>
-            <a:ext cx="10341720" cy="2284920"/>
+            <a:ext cx="10341360" cy="2284560"/>
           </a:xfrm>
           <a:prstGeom prst="rect">
             <a:avLst/>
@@ -3039,7 +2997,7 @@
                 <a:latin typeface="Gill Sans"/>
                 <a:ea typeface="Arial"/>
               </a:rPr>
-              <a:t>A MCMC regression utilizing a subset of features from the Lasso regression model was performed. The model utilizes 2000 draws plus a burn-in of 500 draws on 4 chains. All fits obtained convergence (</a:t>
+              <a:t>A MCMC regression utilizing the important features from the Lasso regression model was performed. All fits obtained convergence (</a:t>
             </a:r>
             <a:r>
               <a:rPr b="0" i="1" lang="en-US" sz="3600" spc="-1" strike="noStrike">
@@ -3080,7 +3038,7 @@
         <p:spPr>
           <a:xfrm>
             <a:off x="838080" y="603000"/>
-            <a:ext cx="1522800" cy="2824920"/>
+            <a:ext cx="1522440" cy="2824560"/>
           </a:xfrm>
           <a:prstGeom prst="rect">
             <a:avLst/>
@@ -3154,7 +3112,7 @@
         <p:spPr>
           <a:xfrm>
             <a:off x="33022440" y="671400"/>
-            <a:ext cx="699120" cy="699120"/>
+            <a:ext cx="698760" cy="698760"/>
           </a:xfrm>
           <a:prstGeom prst="rect">
             <a:avLst/>
@@ -3177,7 +3135,7 @@
         <p:spPr>
           <a:xfrm>
             <a:off x="33050160" y="2826720"/>
-            <a:ext cx="705240" cy="533520"/>
+            <a:ext cx="704880" cy="533160"/>
           </a:xfrm>
           <a:prstGeom prst="rect">
             <a:avLst/>
@@ -3196,7 +3154,7 @@
         <p:spPr>
           <a:xfrm>
             <a:off x="33070680" y="1600200"/>
-            <a:ext cx="1294200" cy="912600"/>
+            <a:ext cx="1293840" cy="912600"/>
           </a:xfrm>
           <a:prstGeom prst="rect">
             <a:avLst/>
@@ -3298,7 +3256,7 @@
         <p:spPr>
           <a:xfrm>
             <a:off x="34160400" y="2666880"/>
-            <a:ext cx="7216560" cy="759960"/>
+            <a:ext cx="7216200" cy="759960"/>
           </a:xfrm>
           <a:prstGeom prst="rect">
             <a:avLst/>
@@ -3349,7 +3307,7 @@
         <p:spPr>
           <a:xfrm>
             <a:off x="742320" y="19227600"/>
-            <a:ext cx="9498600" cy="6206400"/>
+            <a:ext cx="9498240" cy="6206040"/>
           </a:xfrm>
           <a:prstGeom prst="rect">
             <a:avLst/>
@@ -3386,7 +3344,7 @@
                 <a:latin typeface="Gill Sans"/>
                 <a:ea typeface="Arial"/>
               </a:rPr>
-              <a:t>The IPEDS database consists of annual survey data collected from post-secondary institutions. Targets are bachelor’s degrees completed within 6 years in 2016-17. Features include institutional, admissions, and student financial aid data. There were 682 institutions with all considered features. Variance inflation factors above 5 were eliminated, resulting in the feature set below.  </a:t>
+              <a:t>The IPEDS database consists of annual survey data collected from post-secondary institutions. Targets are bachelor’s degrees completed within 6 years in 2016-17. Features include institution characteristics, admissions data, and student financial aid data. There were 682 institutions with all considered features. Variance inflation factors above 5 were eliminated, resulting in the feature set below.  </a:t>
             </a:r>
             <a:endParaRPr b="0" lang="en-US" sz="3600" spc="-1" strike="noStrike">
               <a:latin typeface="Arial"/>
@@ -3407,7 +3365,7 @@
         <p:spPr>
           <a:xfrm>
             <a:off x="10436400" y="25467480"/>
-            <a:ext cx="10411560" cy="7031880"/>
+            <a:ext cx="10411200" cy="7031520"/>
           </a:xfrm>
           <a:prstGeom prst="rect">
             <a:avLst/>
@@ -3431,7 +3389,7 @@
         <p:spPr>
           <a:xfrm>
             <a:off x="731520" y="25536240"/>
-            <a:ext cx="9475560" cy="6949080"/>
+            <a:ext cx="9475200" cy="6948720"/>
           </a:xfrm>
           <a:prstGeom prst="rect">
             <a:avLst/>
@@ -3450,7 +3408,7 @@
         <p:spPr>
           <a:xfrm>
             <a:off x="11155680" y="6503400"/>
-            <a:ext cx="10362240" cy="1817280"/>
+            <a:ext cx="10361880" cy="1816920"/>
           </a:xfrm>
           <a:prstGeom prst="rect">
             <a:avLst/>
@@ -3509,7 +3467,7 @@
         <p:spPr>
           <a:xfrm>
             <a:off x="11176920" y="8745840"/>
-            <a:ext cx="10311120" cy="7303320"/>
+            <a:ext cx="10310760" cy="7302960"/>
           </a:xfrm>
           <a:prstGeom prst="rect">
             <a:avLst/>
@@ -3528,7 +3486,7 @@
         <p:spPr>
           <a:xfrm>
             <a:off x="13167360" y="8147520"/>
-            <a:ext cx="7040520" cy="597960"/>
+            <a:ext cx="7040160" cy="597600"/>
           </a:xfrm>
           <a:prstGeom prst="rect">
             <a:avLst/>
@@ -3582,7 +3540,7 @@
         <p:spPr>
           <a:xfrm>
             <a:off x="11277720" y="16285680"/>
-            <a:ext cx="10210320" cy="777600"/>
+            <a:ext cx="10209960" cy="777240"/>
           </a:xfrm>
           <a:prstGeom prst="rect">
             <a:avLst/>
@@ -3603,7 +3561,7 @@
             <a:spAutoFit/>
           </a:bodyPr>
           <a:p>
-            <a:pPr marL="216000" indent="-215640">
+            <a:pPr marL="216000" indent="-215280">
               <a:lnSpc>
                 <a:spcPct val="100000"/>
               </a:lnSpc>
@@ -3651,7 +3609,7 @@
         <p:spPr>
           <a:xfrm>
             <a:off x="11237760" y="17130240"/>
-            <a:ext cx="10158840" cy="2284920"/>
+            <a:ext cx="10158480" cy="2284560"/>
           </a:xfrm>
           <a:prstGeom prst="rect">
             <a:avLst/>
@@ -3707,7 +3665,7 @@
             <p:spPr>
               <a:xfrm>
                 <a:off x="13990320" y="18870840"/>
-                <a:ext cx="592560" cy="544320"/>
+                <a:ext cx="592200" cy="543960"/>
               </a:xfrm>
               <a:prstGeom prst="rect">
                 <a:avLst/>
@@ -3746,9 +3704,9 @@
         <p:grpSpPr>
           <a:xfrm>
             <a:off x="10881360" y="19571040"/>
-            <a:ext cx="10423800" cy="5892840"/>
+            <a:ext cx="10423440" cy="5892480"/>
             <a:chOff x="10881360" y="19571040"/>
-            <a:chExt cx="10423800" cy="5892840"/>
+            <a:chExt cx="10423440" cy="5892480"/>
           </a:xfrm>
         </p:grpSpPr>
         <p:pic>
@@ -3759,13 +3717,13 @@
           </p:nvPicPr>
           <p:blipFill>
             <a:blip r:embed="rId7"/>
-            <a:srcRect l="0" t="0" r="0" b="50439"/>
+            <a:srcRect l="0" t="0" r="0" b="50432"/>
             <a:stretch/>
           </p:blipFill>
           <p:spPr>
             <a:xfrm>
               <a:off x="10881360" y="20252520"/>
-              <a:ext cx="10423800" cy="5211360"/>
+              <a:ext cx="10423440" cy="5211000"/>
             </a:xfrm>
             <a:prstGeom prst="rect">
               <a:avLst/>
@@ -3784,7 +3742,7 @@
           <p:spPr>
             <a:xfrm>
               <a:off x="13529160" y="19571040"/>
-              <a:ext cx="5785920" cy="597960"/>
+              <a:ext cx="5785560" cy="597600"/>
             </a:xfrm>
             <a:prstGeom prst="rect">
               <a:avLst/>
@@ -3839,9 +3797,9 @@
         <p:grpSpPr>
           <a:xfrm>
             <a:off x="22399920" y="5760720"/>
-            <a:ext cx="10243800" cy="6126120"/>
+            <a:ext cx="10243440" cy="6125760"/>
             <a:chOff x="22399920" y="5760720"/>
-            <a:chExt cx="10243800" cy="6126120"/>
+            <a:chExt cx="10243440" cy="6125760"/>
           </a:xfrm>
         </p:grpSpPr>
         <p:pic>
@@ -3852,13 +3810,13 @@
           </p:nvPicPr>
           <p:blipFill>
             <a:blip r:embed="rId8"/>
-            <a:srcRect l="0" t="49992" r="0" b="-927"/>
+            <a:srcRect l="0" t="49985" r="0" b="-927"/>
             <a:stretch/>
           </p:blipFill>
           <p:spPr>
             <a:xfrm>
               <a:off x="22399920" y="6452640"/>
-              <a:ext cx="10243800" cy="5434200"/>
+              <a:ext cx="10243440" cy="5433840"/>
             </a:xfrm>
             <a:prstGeom prst="rect">
               <a:avLst/>
@@ -3877,7 +3835,7 @@
           <p:spPr>
             <a:xfrm>
               <a:off x="24916320" y="5760720"/>
-              <a:ext cx="5685840" cy="597960"/>
+              <a:ext cx="5685480" cy="597600"/>
             </a:xfrm>
             <a:prstGeom prst="rect">
               <a:avLst/>
@@ -3932,7 +3890,7 @@
         <p:spPr>
           <a:xfrm>
             <a:off x="22368600" y="12000960"/>
-            <a:ext cx="10210320" cy="777600"/>
+            <a:ext cx="10209960" cy="777240"/>
           </a:xfrm>
           <a:prstGeom prst="rect">
             <a:avLst/>
@@ -3953,7 +3911,7 @@
             <a:spAutoFit/>
           </a:bodyPr>
           <a:p>
-            <a:pPr marL="216000" indent="-215640">
+            <a:pPr marL="216000" indent="-215280">
               <a:lnSpc>
                 <a:spcPct val="100000"/>
               </a:lnSpc>
@@ -4001,7 +3959,7 @@
         <p:spPr>
           <a:xfrm>
             <a:off x="33764040" y="28352160"/>
-            <a:ext cx="9685800" cy="1900080"/>
+            <a:ext cx="9685440" cy="1899720"/>
           </a:xfrm>
           <a:prstGeom prst="rect">
             <a:avLst/>
@@ -4052,7 +4010,7 @@
         <p:spPr>
           <a:xfrm>
             <a:off x="33733440" y="30384360"/>
-            <a:ext cx="9752400" cy="2351160"/>
+            <a:ext cx="9752040" cy="2350800"/>
           </a:xfrm>
           <a:prstGeom prst="rect">
             <a:avLst/>
@@ -4073,7 +4031,7 @@
             <a:spAutoFit/>
           </a:bodyPr>
           <a:p>
-            <a:pPr marL="343080" indent="-342000">
+            <a:pPr marL="343080" indent="-341640">
               <a:lnSpc>
                 <a:spcPct val="100000"/>
               </a:lnSpc>
@@ -4121,7 +4079,7 @@
             </a:endParaRPr>
           </a:p>
           <a:p>
-            <a:pPr marL="343080" indent="-342000">
+            <a:pPr marL="343080" indent="-341640">
               <a:lnSpc>
                 <a:spcPct val="100000"/>
               </a:lnSpc>
@@ -4149,7 +4107,7 @@
             </a:endParaRPr>
           </a:p>
           <a:p>
-            <a:pPr marL="343080" indent="-342000">
+            <a:pPr marL="343080" indent="-341640">
               <a:lnSpc>
                 <a:spcPct val="100000"/>
               </a:lnSpc>
@@ -4178,39 +4136,16 @@
           </a:p>
         </p:txBody>
       </p:sp>
-      <p:pic>
-        <p:nvPicPr>
-          <p:cNvPr id="87" name="" descr=""/>
-          <p:cNvPicPr/>
-          <p:nvPr/>
-        </p:nvPicPr>
-        <p:blipFill>
-          <a:blip r:embed="rId9"/>
-          <a:stretch/>
-        </p:blipFill>
-        <p:spPr>
-          <a:xfrm>
-            <a:off x="22585680" y="17556480"/>
-            <a:ext cx="9692640" cy="9784080"/>
-          </a:xfrm>
-          <a:prstGeom prst="rect">
-            <a:avLst/>
-          </a:prstGeom>
-          <a:ln>
-            <a:noFill/>
-          </a:ln>
-        </p:spPr>
-      </p:pic>
-      <p:sp>
-        <p:nvSpPr>
-          <p:cNvPr id="88" name="CustomShape 32"/>
+      <p:sp>
+        <p:nvSpPr>
+          <p:cNvPr id="87" name="CustomShape 32"/>
           <p:cNvSpPr/>
           <p:nvPr/>
         </p:nvSpPr>
         <p:spPr>
           <a:xfrm>
             <a:off x="33684120" y="4333680"/>
-            <a:ext cx="9991080" cy="1027800"/>
+            <a:ext cx="9990720" cy="1027440"/>
           </a:xfrm>
           <a:prstGeom prst="rect">
             <a:avLst/>
@@ -4257,30 +4192,285 @@
           </a:p>
         </p:txBody>
       </p:sp>
+      <p:pic>
+        <p:nvPicPr>
+          <p:cNvPr id="88" name="" descr=""/>
+          <p:cNvPicPr/>
+          <p:nvPr/>
+        </p:nvPicPr>
+        <p:blipFill>
+          <a:blip r:embed="rId9"/>
+          <a:stretch/>
+        </p:blipFill>
+        <p:spPr>
+          <a:xfrm>
+            <a:off x="22128480" y="31377600"/>
+            <a:ext cx="3885480" cy="808920"/>
+          </a:xfrm>
+          <a:prstGeom prst="rect">
+            <a:avLst/>
+          </a:prstGeom>
+          <a:ln>
+            <a:noFill/>
+          </a:ln>
+        </p:spPr>
+      </p:pic>
+      <p:pic>
+        <p:nvPicPr>
+          <p:cNvPr id="89" name="" descr=""/>
+          <p:cNvPicPr/>
+          <p:nvPr/>
+        </p:nvPicPr>
+        <p:blipFill>
+          <a:blip r:embed="rId10"/>
+          <a:stretch/>
+        </p:blipFill>
+        <p:spPr>
+          <a:xfrm>
+            <a:off x="22402800" y="28803600"/>
+            <a:ext cx="3180960" cy="1074240"/>
+          </a:xfrm>
+          <a:prstGeom prst="rect">
+            <a:avLst/>
+          </a:prstGeom>
+          <a:ln>
+            <a:noFill/>
+          </a:ln>
+        </p:spPr>
+      </p:pic>
+      <p:pic>
+        <p:nvPicPr>
+          <p:cNvPr id="90" name="" descr=""/>
+          <p:cNvPicPr/>
+          <p:nvPr/>
+        </p:nvPicPr>
+        <p:blipFill>
+          <a:blip r:embed="rId11"/>
+          <a:stretch/>
+        </p:blipFill>
+        <p:spPr>
+          <a:xfrm>
+            <a:off x="22774680" y="30041640"/>
+            <a:ext cx="2645280" cy="1047600"/>
+          </a:xfrm>
+          <a:prstGeom prst="rect">
+            <a:avLst/>
+          </a:prstGeom>
+          <a:ln>
+            <a:noFill/>
+          </a:ln>
+        </p:spPr>
+      </p:pic>
+      <p:pic>
+        <p:nvPicPr>
+          <p:cNvPr id="91" name="" descr=""/>
+          <p:cNvPicPr/>
+          <p:nvPr/>
+        </p:nvPicPr>
+        <p:blipFill>
+          <a:blip r:embed="rId12"/>
+          <a:stretch/>
+        </p:blipFill>
+        <p:spPr>
+          <a:xfrm>
+            <a:off x="26517600" y="28803600"/>
+            <a:ext cx="2005920" cy="1079640"/>
+          </a:xfrm>
+          <a:prstGeom prst="rect">
+            <a:avLst/>
+          </a:prstGeom>
+          <a:ln>
+            <a:noFill/>
+          </a:ln>
+        </p:spPr>
+      </p:pic>
+      <p:pic>
+        <p:nvPicPr>
+          <p:cNvPr id="92" name="" descr=""/>
+          <p:cNvPicPr/>
+          <p:nvPr/>
+        </p:nvPicPr>
+        <p:blipFill>
+          <a:blip r:embed="rId13"/>
+          <a:stretch/>
+        </p:blipFill>
+        <p:spPr>
+          <a:xfrm>
+            <a:off x="26151840" y="30165840"/>
+            <a:ext cx="3088800" cy="740520"/>
+          </a:xfrm>
+          <a:prstGeom prst="rect">
+            <a:avLst/>
+          </a:prstGeom>
+          <a:ln>
+            <a:noFill/>
+          </a:ln>
+        </p:spPr>
+      </p:pic>
+      <p:pic>
+        <p:nvPicPr>
+          <p:cNvPr id="93" name="" descr=""/>
+          <p:cNvPicPr/>
+          <p:nvPr/>
+        </p:nvPicPr>
+        <p:blipFill>
+          <a:blip r:embed="rId14"/>
+          <a:stretch/>
+        </p:blipFill>
+        <p:spPr>
+          <a:xfrm>
+            <a:off x="29626560" y="28924560"/>
+            <a:ext cx="2483280" cy="884520"/>
+          </a:xfrm>
+          <a:prstGeom prst="rect">
+            <a:avLst/>
+          </a:prstGeom>
+          <a:ln>
+            <a:noFill/>
+          </a:ln>
+        </p:spPr>
+      </p:pic>
+      <p:pic>
+        <p:nvPicPr>
+          <p:cNvPr id="94" name="" descr=""/>
+          <p:cNvPicPr/>
+          <p:nvPr/>
+        </p:nvPicPr>
+        <p:blipFill>
+          <a:blip r:embed="rId15"/>
+          <a:stretch/>
+        </p:blipFill>
+        <p:spPr>
+          <a:xfrm>
+            <a:off x="29432880" y="29986560"/>
+            <a:ext cx="2936520" cy="1141560"/>
+          </a:xfrm>
+          <a:prstGeom prst="rect">
+            <a:avLst/>
+          </a:prstGeom>
+          <a:ln>
+            <a:noFill/>
+          </a:ln>
+        </p:spPr>
+      </p:pic>
+      <p:pic>
+        <p:nvPicPr>
+          <p:cNvPr id="95" name="" descr=""/>
+          <p:cNvPicPr/>
+          <p:nvPr/>
+        </p:nvPicPr>
+        <p:blipFill>
+          <a:blip r:embed="rId16"/>
+          <a:stretch/>
+        </p:blipFill>
+        <p:spPr>
+          <a:xfrm>
+            <a:off x="26954640" y="31164480"/>
+            <a:ext cx="1848600" cy="1386360"/>
+          </a:xfrm>
+          <a:prstGeom prst="rect">
+            <a:avLst/>
+          </a:prstGeom>
+          <a:ln>
+            <a:noFill/>
+          </a:ln>
+        </p:spPr>
+      </p:pic>
+      <p:pic>
+        <p:nvPicPr>
+          <p:cNvPr id="96" name="" descr=""/>
+          <p:cNvPicPr/>
+          <p:nvPr/>
+        </p:nvPicPr>
+        <p:blipFill>
+          <a:blip r:embed="rId17"/>
+          <a:srcRect l="0" t="10526" r="0" b="20999"/>
+          <a:stretch/>
+        </p:blipFill>
+        <p:spPr>
+          <a:xfrm>
+            <a:off x="29556720" y="31272480"/>
+            <a:ext cx="2812680" cy="1188000"/>
+          </a:xfrm>
+          <a:prstGeom prst="rect">
+            <a:avLst/>
+          </a:prstGeom>
+          <a:ln>
+            <a:noFill/>
+          </a:ln>
+        </p:spPr>
+      </p:pic>
+      <p:pic>
+        <p:nvPicPr>
+          <p:cNvPr id="97" name="" descr=""/>
+          <p:cNvPicPr/>
+          <p:nvPr/>
+        </p:nvPicPr>
+        <p:blipFill>
+          <a:blip r:embed="rId18"/>
+          <a:stretch/>
+        </p:blipFill>
+        <p:spPr>
+          <a:xfrm>
+            <a:off x="34107120" y="20692440"/>
+            <a:ext cx="8778240" cy="6267600"/>
+          </a:xfrm>
+          <a:prstGeom prst="rect">
+            <a:avLst/>
+          </a:prstGeom>
+          <a:ln>
+            <a:noFill/>
+          </a:ln>
+        </p:spPr>
+      </p:pic>
       <p:grpSp>
         <p:nvGrpSpPr>
-          <p:cNvPr id="89" name="Group 33"/>
+          <p:cNvPr id="98" name="Group 33"/>
           <p:cNvGrpSpPr/>
           <p:nvPr/>
         </p:nvGrpSpPr>
         <p:grpSpPr>
           <a:xfrm>
-            <a:off x="33617520" y="5669280"/>
-            <a:ext cx="9359280" cy="11194560"/>
-            <a:chOff x="33617520" y="5669280"/>
-            <a:chExt cx="9359280" cy="11194560"/>
+            <a:off x="22585680" y="16916400"/>
+            <a:ext cx="9414000" cy="9741960"/>
+            <a:chOff x="22585680" y="16916400"/>
+            <a:chExt cx="9414000" cy="9741960"/>
           </a:xfrm>
         </p:grpSpPr>
+        <p:pic>
+          <p:nvPicPr>
+            <p:cNvPr id="99" name="" descr=""/>
+            <p:cNvPicPr/>
+            <p:nvPr/>
+          </p:nvPicPr>
+          <p:blipFill>
+            <a:blip r:embed="rId19"/>
+            <a:srcRect l="0" t="3024" r="0" b="0"/>
+            <a:stretch/>
+          </p:blipFill>
+          <p:spPr>
+            <a:xfrm>
+              <a:off x="22585680" y="17519760"/>
+              <a:ext cx="9414000" cy="9138600"/>
+            </a:xfrm>
+            <a:prstGeom prst="rect">
+              <a:avLst/>
+            </a:prstGeom>
+            <a:ln>
+              <a:noFill/>
+            </a:ln>
+          </p:spPr>
+        </p:pic>
         <p:sp>
           <p:nvSpPr>
-            <p:cNvPr id="90" name="CustomShape 34"/>
+            <p:cNvPr id="100" name="CustomShape 34"/>
             <p:cNvSpPr/>
             <p:nvPr/>
           </p:nvSpPr>
           <p:spPr>
             <a:xfrm>
-              <a:off x="35478720" y="5669280"/>
-              <a:ext cx="6949440" cy="598320"/>
+              <a:off x="23389200" y="16916400"/>
+              <a:ext cx="8345880" cy="598320"/>
             </a:xfrm>
             <a:prstGeom prst="rect">
               <a:avLst/>
@@ -4317,7 +4507,7 @@
                   <a:latin typeface="Gill Sans"/>
                   <a:ea typeface="Arial"/>
                 </a:rPr>
-                <a:t>Mean Predicted </a:t>
+                <a:t>C</a:t>
               </a:r>
               <a:r>
                 <a:rPr b="1" lang="en-US" sz="2800" spc="-1" strike="noStrike">
@@ -4327,7 +4517,436 @@
                   <a:latin typeface="Gill Sans"/>
                   <a:ea typeface="Arial"/>
                 </a:rPr>
-                <a:t>Graduation Rate</a:t>
+                <a:t>o</a:t>
+              </a:r>
+              <a:r>
+                <a:rPr b="1" lang="en-US" sz="2800" spc="-1" strike="noStrike">
+                  <a:solidFill>
+                    <a:srgbClr val="393939"/>
+                  </a:solidFill>
+                  <a:latin typeface="Gill Sans"/>
+                  <a:ea typeface="Arial"/>
+                </a:rPr>
+                <a:t>e</a:t>
+              </a:r>
+              <a:r>
+                <a:rPr b="1" lang="en-US" sz="2800" spc="-1" strike="noStrike">
+                  <a:solidFill>
+                    <a:srgbClr val="393939"/>
+                  </a:solidFill>
+                  <a:latin typeface="Gill Sans"/>
+                  <a:ea typeface="Arial"/>
+                </a:rPr>
+                <a:t>f</a:t>
+              </a:r>
+              <a:r>
+                <a:rPr b="1" lang="en-US" sz="2800" spc="-1" strike="noStrike">
+                  <a:solidFill>
+                    <a:srgbClr val="393939"/>
+                  </a:solidFill>
+                  <a:latin typeface="Gill Sans"/>
+                  <a:ea typeface="Arial"/>
+                </a:rPr>
+                <a:t>f</a:t>
+              </a:r>
+              <a:r>
+                <a:rPr b="1" lang="en-US" sz="2800" spc="-1" strike="noStrike">
+                  <a:solidFill>
+                    <a:srgbClr val="393939"/>
+                  </a:solidFill>
+                  <a:latin typeface="Gill Sans"/>
+                  <a:ea typeface="Arial"/>
+                </a:rPr>
+                <a:t>i</a:t>
+              </a:r>
+              <a:r>
+                <a:rPr b="1" lang="en-US" sz="2800" spc="-1" strike="noStrike">
+                  <a:solidFill>
+                    <a:srgbClr val="393939"/>
+                  </a:solidFill>
+                  <a:latin typeface="Gill Sans"/>
+                  <a:ea typeface="Arial"/>
+                </a:rPr>
+                <a:t>c</a:t>
+              </a:r>
+              <a:r>
+                <a:rPr b="1" lang="en-US" sz="2800" spc="-1" strike="noStrike">
+                  <a:solidFill>
+                    <a:srgbClr val="393939"/>
+                  </a:solidFill>
+                  <a:latin typeface="Gill Sans"/>
+                  <a:ea typeface="Arial"/>
+                </a:rPr>
+                <a:t>i</a:t>
+              </a:r>
+              <a:r>
+                <a:rPr b="1" lang="en-US" sz="2800" spc="-1" strike="noStrike">
+                  <a:solidFill>
+                    <a:srgbClr val="393939"/>
+                  </a:solidFill>
+                  <a:latin typeface="Gill Sans"/>
+                  <a:ea typeface="Arial"/>
+                </a:rPr>
+                <a:t>e</a:t>
+              </a:r>
+              <a:r>
+                <a:rPr b="1" lang="en-US" sz="2800" spc="-1" strike="noStrike">
+                  <a:solidFill>
+                    <a:srgbClr val="393939"/>
+                  </a:solidFill>
+                  <a:latin typeface="Gill Sans"/>
+                  <a:ea typeface="Arial"/>
+                </a:rPr>
+                <a:t>n</a:t>
+              </a:r>
+              <a:r>
+                <a:rPr b="1" lang="en-US" sz="2800" spc="-1" strike="noStrike">
+                  <a:solidFill>
+                    <a:srgbClr val="393939"/>
+                  </a:solidFill>
+                  <a:latin typeface="Gill Sans"/>
+                  <a:ea typeface="Arial"/>
+                </a:rPr>
+                <a:t>t</a:t>
+              </a:r>
+              <a:r>
+                <a:rPr b="1" lang="en-US" sz="2800" spc="-1" strike="noStrike">
+                  <a:solidFill>
+                    <a:srgbClr val="393939"/>
+                  </a:solidFill>
+                  <a:latin typeface="Gill Sans"/>
+                  <a:ea typeface="Arial"/>
+                </a:rPr>
+                <a:t>s</a:t>
+              </a:r>
+              <a:r>
+                <a:rPr b="1" lang="en-US" sz="2800" spc="-1" strike="noStrike">
+                  <a:solidFill>
+                    <a:srgbClr val="393939"/>
+                  </a:solidFill>
+                  <a:latin typeface="Gill Sans"/>
+                  <a:ea typeface="Arial"/>
+                </a:rPr>
+                <a:t>:</a:t>
+              </a:r>
+              <a:r>
+                <a:rPr b="1" lang="en-US" sz="2800" spc="-1" strike="noStrike">
+                  <a:solidFill>
+                    <a:srgbClr val="393939"/>
+                  </a:solidFill>
+                  <a:latin typeface="Gill Sans"/>
+                  <a:ea typeface="Arial"/>
+                </a:rPr>
+                <a:t> </a:t>
+              </a:r>
+              <a:r>
+                <a:rPr b="1" lang="en-US" sz="2800" spc="-1" strike="noStrike">
+                  <a:solidFill>
+                    <a:srgbClr val="393939"/>
+                  </a:solidFill>
+                  <a:latin typeface="Gill Sans"/>
+                  <a:ea typeface="Arial"/>
+                </a:rPr>
+                <a:t>H</a:t>
+              </a:r>
+              <a:r>
+                <a:rPr b="1" lang="en-US" sz="2800" spc="-1" strike="noStrike">
+                  <a:solidFill>
+                    <a:srgbClr val="393939"/>
+                  </a:solidFill>
+                  <a:latin typeface="Gill Sans"/>
+                  <a:ea typeface="Arial"/>
+                </a:rPr>
+                <a:t>i</a:t>
+              </a:r>
+              <a:r>
+                <a:rPr b="1" lang="en-US" sz="2800" spc="-1" strike="noStrike">
+                  <a:solidFill>
+                    <a:srgbClr val="393939"/>
+                  </a:solidFill>
+                  <a:latin typeface="Gill Sans"/>
+                  <a:ea typeface="Arial"/>
+                </a:rPr>
+                <a:t>s</a:t>
+              </a:r>
+              <a:r>
+                <a:rPr b="1" lang="en-US" sz="2800" spc="-1" strike="noStrike">
+                  <a:solidFill>
+                    <a:srgbClr val="393939"/>
+                  </a:solidFill>
+                  <a:latin typeface="Gill Sans"/>
+                  <a:ea typeface="Arial"/>
+                </a:rPr>
+                <a:t>p</a:t>
+              </a:r>
+              <a:r>
+                <a:rPr b="1" lang="en-US" sz="2800" spc="-1" strike="noStrike">
+                  <a:solidFill>
+                    <a:srgbClr val="393939"/>
+                  </a:solidFill>
+                  <a:latin typeface="Gill Sans"/>
+                  <a:ea typeface="Arial"/>
+                </a:rPr>
+                <a:t>a</a:t>
+              </a:r>
+              <a:r>
+                <a:rPr b="1" lang="en-US" sz="2800" spc="-1" strike="noStrike">
+                  <a:solidFill>
+                    <a:srgbClr val="393939"/>
+                  </a:solidFill>
+                  <a:latin typeface="Gill Sans"/>
+                  <a:ea typeface="Arial"/>
+                </a:rPr>
+                <a:t>n</a:t>
+              </a:r>
+              <a:r>
+                <a:rPr b="1" lang="en-US" sz="2800" spc="-1" strike="noStrike">
+                  <a:solidFill>
+                    <a:srgbClr val="393939"/>
+                  </a:solidFill>
+                  <a:latin typeface="Gill Sans"/>
+                  <a:ea typeface="Arial"/>
+                </a:rPr>
+                <a:t>i</a:t>
+              </a:r>
+              <a:r>
+                <a:rPr b="1" lang="en-US" sz="2800" spc="-1" strike="noStrike">
+                  <a:solidFill>
+                    <a:srgbClr val="393939"/>
+                  </a:solidFill>
+                  <a:latin typeface="Gill Sans"/>
+                  <a:ea typeface="Arial"/>
+                </a:rPr>
+                <a:t>c</a:t>
+              </a:r>
+              <a:r>
+                <a:rPr b="1" lang="en-US" sz="2800" spc="-1" strike="noStrike">
+                  <a:solidFill>
+                    <a:srgbClr val="393939"/>
+                  </a:solidFill>
+                  <a:latin typeface="Gill Sans"/>
+                  <a:ea typeface="Arial"/>
+                </a:rPr>
+                <a:t> </a:t>
+              </a:r>
+              <a:r>
+                <a:rPr b="1" lang="en-US" sz="2800" spc="-1" strike="noStrike">
+                  <a:solidFill>
+                    <a:srgbClr val="393939"/>
+                  </a:solidFill>
+                  <a:latin typeface="Gill Sans"/>
+                  <a:ea typeface="Arial"/>
+                </a:rPr>
+                <a:t>G</a:t>
+              </a:r>
+              <a:r>
+                <a:rPr b="1" lang="en-US" sz="2800" spc="-1" strike="noStrike">
+                  <a:solidFill>
+                    <a:srgbClr val="393939"/>
+                  </a:solidFill>
+                  <a:latin typeface="Gill Sans"/>
+                  <a:ea typeface="Arial"/>
+                </a:rPr>
+                <a:t>r</a:t>
+              </a:r>
+              <a:r>
+                <a:rPr b="1" lang="en-US" sz="2800" spc="-1" strike="noStrike">
+                  <a:solidFill>
+                    <a:srgbClr val="393939"/>
+                  </a:solidFill>
+                  <a:latin typeface="Gill Sans"/>
+                  <a:ea typeface="Arial"/>
+                </a:rPr>
+                <a:t>a</a:t>
+              </a:r>
+              <a:r>
+                <a:rPr b="1" lang="en-US" sz="2800" spc="-1" strike="noStrike">
+                  <a:solidFill>
+                    <a:srgbClr val="393939"/>
+                  </a:solidFill>
+                  <a:latin typeface="Gill Sans"/>
+                  <a:ea typeface="Arial"/>
+                </a:rPr>
+                <a:t>d</a:t>
+              </a:r>
+              <a:r>
+                <a:rPr b="1" lang="en-US" sz="2800" spc="-1" strike="noStrike">
+                  <a:solidFill>
+                    <a:srgbClr val="393939"/>
+                  </a:solidFill>
+                  <a:latin typeface="Gill Sans"/>
+                  <a:ea typeface="Arial"/>
+                </a:rPr>
+                <a:t>u</a:t>
+              </a:r>
+              <a:r>
+                <a:rPr b="1" lang="en-US" sz="2800" spc="-1" strike="noStrike">
+                  <a:solidFill>
+                    <a:srgbClr val="393939"/>
+                  </a:solidFill>
+                  <a:latin typeface="Gill Sans"/>
+                  <a:ea typeface="Arial"/>
+                </a:rPr>
+                <a:t>a</a:t>
+              </a:r>
+              <a:r>
+                <a:rPr b="1" lang="en-US" sz="2800" spc="-1" strike="noStrike">
+                  <a:solidFill>
+                    <a:srgbClr val="393939"/>
+                  </a:solidFill>
+                  <a:latin typeface="Gill Sans"/>
+                  <a:ea typeface="Arial"/>
+                </a:rPr>
+                <a:t>t</a:t>
+              </a:r>
+              <a:r>
+                <a:rPr b="1" lang="en-US" sz="2800" spc="-1" strike="noStrike">
+                  <a:solidFill>
+                    <a:srgbClr val="393939"/>
+                  </a:solidFill>
+                  <a:latin typeface="Gill Sans"/>
+                  <a:ea typeface="Arial"/>
+                </a:rPr>
+                <a:t>i</a:t>
+              </a:r>
+              <a:r>
+                <a:rPr b="1" lang="en-US" sz="2800" spc="-1" strike="noStrike">
+                  <a:solidFill>
+                    <a:srgbClr val="393939"/>
+                  </a:solidFill>
+                  <a:latin typeface="Gill Sans"/>
+                  <a:ea typeface="Arial"/>
+                </a:rPr>
+                <a:t>o</a:t>
+              </a:r>
+              <a:r>
+                <a:rPr b="1" lang="en-US" sz="2800" spc="-1" strike="noStrike">
+                  <a:solidFill>
+                    <a:srgbClr val="393939"/>
+                  </a:solidFill>
+                  <a:latin typeface="Gill Sans"/>
+                  <a:ea typeface="Arial"/>
+                </a:rPr>
+                <a:t>n</a:t>
+              </a:r>
+              <a:r>
+                <a:rPr b="1" lang="en-US" sz="2800" spc="-1" strike="noStrike">
+                  <a:solidFill>
+                    <a:srgbClr val="393939"/>
+                  </a:solidFill>
+                  <a:latin typeface="Gill Sans"/>
+                  <a:ea typeface="Arial"/>
+                </a:rPr>
+                <a:t> </a:t>
+              </a:r>
+              <a:r>
+                <a:rPr b="1" lang="en-US" sz="2800" spc="-1" strike="noStrike">
+                  <a:solidFill>
+                    <a:srgbClr val="393939"/>
+                  </a:solidFill>
+                  <a:latin typeface="Gill Sans"/>
+                  <a:ea typeface="Arial"/>
+                </a:rPr>
+                <a:t>R</a:t>
+              </a:r>
+              <a:r>
+                <a:rPr b="1" lang="en-US" sz="2800" spc="-1" strike="noStrike">
+                  <a:solidFill>
+                    <a:srgbClr val="393939"/>
+                  </a:solidFill>
+                  <a:latin typeface="Gill Sans"/>
+                  <a:ea typeface="Arial"/>
+                </a:rPr>
+                <a:t>a</a:t>
+              </a:r>
+              <a:r>
+                <a:rPr b="1" lang="en-US" sz="2800" spc="-1" strike="noStrike">
+                  <a:solidFill>
+                    <a:srgbClr val="393939"/>
+                  </a:solidFill>
+                  <a:latin typeface="Gill Sans"/>
+                  <a:ea typeface="Arial"/>
+                </a:rPr>
+                <a:t>t</a:t>
+              </a:r>
+              <a:r>
+                <a:rPr b="1" lang="en-US" sz="2800" spc="-1" strike="noStrike">
+                  <a:solidFill>
+                    <a:srgbClr val="393939"/>
+                  </a:solidFill>
+                  <a:latin typeface="Gill Sans"/>
+                  <a:ea typeface="Arial"/>
+                </a:rPr>
+                <a:t>e</a:t>
+              </a:r>
+              <a:endParaRPr b="0" lang="en-US" sz="2800" spc="-1" strike="noStrike">
+                <a:latin typeface="Arial"/>
+              </a:endParaRPr>
+            </a:p>
+          </p:txBody>
+        </p:sp>
+      </p:grpSp>
+      <p:grpSp>
+        <p:nvGrpSpPr>
+          <p:cNvPr id="101" name="Group 35"/>
+          <p:cNvGrpSpPr/>
+          <p:nvPr/>
+        </p:nvGrpSpPr>
+        <p:grpSpPr>
+          <a:xfrm>
+            <a:off x="33284160" y="5669280"/>
+            <a:ext cx="10115280" cy="10717920"/>
+            <a:chOff x="33284160" y="5669280"/>
+            <a:chExt cx="10115280" cy="10717920"/>
+          </a:xfrm>
+        </p:grpSpPr>
+        <p:sp>
+          <p:nvSpPr>
+            <p:cNvPr id="102" name="CustomShape 36"/>
+            <p:cNvSpPr/>
+            <p:nvPr/>
+          </p:nvSpPr>
+          <p:spPr>
+            <a:xfrm>
+              <a:off x="35478720" y="5669280"/>
+              <a:ext cx="6949080" cy="597960"/>
+            </a:xfrm>
+            <a:prstGeom prst="rect">
+              <a:avLst/>
+            </a:prstGeom>
+            <a:noFill/>
+            <a:ln>
+              <a:noFill/>
+            </a:ln>
+          </p:spPr>
+          <p:style>
+            <a:lnRef idx="0"/>
+            <a:fillRef idx="0"/>
+            <a:effectRef idx="0"/>
+            <a:fontRef idx="minor"/>
+          </p:style>
+          <p:txBody>
+            <a:bodyPr lIns="171360" rIns="171360" tIns="85680" bIns="85680">
+              <a:spAutoFit/>
+            </a:bodyPr>
+            <a:p>
+              <a:pPr>
+                <a:lnSpc>
+                  <a:spcPct val="100000"/>
+                </a:lnSpc>
+                <a:spcBef>
+                  <a:spcPts val="2100"/>
+                </a:spcBef>
+              </a:pPr>
+              <a:r>
+                <a:rPr b="1" lang="en-US" sz="2800" spc="-1" strike="noStrike">
+                  <a:solidFill>
+                    <a:srgbClr val="393939"/>
+                  </a:solidFill>
+                  <a:latin typeface="Gill Sans"/>
+                  <a:ea typeface="Arial"/>
+                </a:rPr>
+                <a:t>Predicted Mean Graduation Rate</a:t>
               </a:r>
               <a:endParaRPr b="0" lang="en-US" sz="2800" spc="-1" strike="noStrike">
                 <a:latin typeface="Arial"/>
@@ -4337,19 +4956,19 @@
         </p:sp>
         <p:pic>
           <p:nvPicPr>
-            <p:cNvPr id="91" name="" descr=""/>
+            <p:cNvPr id="103" name="" descr=""/>
             <p:cNvPicPr/>
             <p:nvPr/>
           </p:nvPicPr>
           <p:blipFill>
-            <a:blip r:embed="rId10"/>
-            <a:srcRect l="0" t="2566" r="0" b="0"/>
+            <a:blip r:embed="rId20"/>
+            <a:srcRect l="0" t="3571" r="0" b="0"/>
             <a:stretch/>
           </p:blipFill>
           <p:spPr>
             <a:xfrm>
-              <a:off x="33617520" y="6256800"/>
-              <a:ext cx="9359280" cy="10607040"/>
+              <a:off x="33284160" y="6511680"/>
+              <a:ext cx="10115280" cy="9875520"/>
             </a:xfrm>
             <a:prstGeom prst="rect">
               <a:avLst/>
@@ -4360,237 +4979,6 @@
           </p:spPr>
         </p:pic>
       </p:grpSp>
-      <p:pic>
-        <p:nvPicPr>
-          <p:cNvPr id="92" name="" descr=""/>
-          <p:cNvPicPr/>
-          <p:nvPr/>
-        </p:nvPicPr>
-        <p:blipFill>
-          <a:blip r:embed="rId11"/>
-          <a:stretch/>
-        </p:blipFill>
-        <p:spPr>
-          <a:xfrm>
-            <a:off x="34107120" y="20756880"/>
-            <a:ext cx="8595360" cy="6149160"/>
-          </a:xfrm>
-          <a:prstGeom prst="rect">
-            <a:avLst/>
-          </a:prstGeom>
-          <a:ln>
-            <a:noFill/>
-          </a:ln>
-        </p:spPr>
-      </p:pic>
-      <p:pic>
-        <p:nvPicPr>
-          <p:cNvPr id="93" name="" descr=""/>
-          <p:cNvPicPr/>
-          <p:nvPr/>
-        </p:nvPicPr>
-        <p:blipFill>
-          <a:blip r:embed="rId12"/>
-          <a:stretch/>
-        </p:blipFill>
-        <p:spPr>
-          <a:xfrm>
-            <a:off x="22128480" y="31377600"/>
-            <a:ext cx="3885840" cy="809280"/>
-          </a:xfrm>
-          <a:prstGeom prst="rect">
-            <a:avLst/>
-          </a:prstGeom>
-          <a:ln>
-            <a:noFill/>
-          </a:ln>
-        </p:spPr>
-      </p:pic>
-      <p:pic>
-        <p:nvPicPr>
-          <p:cNvPr id="94" name="" descr=""/>
-          <p:cNvPicPr/>
-          <p:nvPr/>
-        </p:nvPicPr>
-        <p:blipFill>
-          <a:blip r:embed="rId13"/>
-          <a:stretch/>
-        </p:blipFill>
-        <p:spPr>
-          <a:xfrm>
-            <a:off x="22402800" y="28803600"/>
-            <a:ext cx="3181320" cy="1074600"/>
-          </a:xfrm>
-          <a:prstGeom prst="rect">
-            <a:avLst/>
-          </a:prstGeom>
-          <a:ln>
-            <a:noFill/>
-          </a:ln>
-        </p:spPr>
-      </p:pic>
-      <p:pic>
-        <p:nvPicPr>
-          <p:cNvPr id="95" name="" descr=""/>
-          <p:cNvPicPr/>
-          <p:nvPr/>
-        </p:nvPicPr>
-        <p:blipFill>
-          <a:blip r:embed="rId14"/>
-          <a:stretch/>
-        </p:blipFill>
-        <p:spPr>
-          <a:xfrm>
-            <a:off x="22774680" y="30041640"/>
-            <a:ext cx="2645640" cy="1047960"/>
-          </a:xfrm>
-          <a:prstGeom prst="rect">
-            <a:avLst/>
-          </a:prstGeom>
-          <a:ln>
-            <a:noFill/>
-          </a:ln>
-        </p:spPr>
-      </p:pic>
-      <p:pic>
-        <p:nvPicPr>
-          <p:cNvPr id="96" name="" descr=""/>
-          <p:cNvPicPr/>
-          <p:nvPr/>
-        </p:nvPicPr>
-        <p:blipFill>
-          <a:blip r:embed="rId15"/>
-          <a:stretch/>
-        </p:blipFill>
-        <p:spPr>
-          <a:xfrm>
-            <a:off x="26517600" y="28803600"/>
-            <a:ext cx="2006280" cy="1080000"/>
-          </a:xfrm>
-          <a:prstGeom prst="rect">
-            <a:avLst/>
-          </a:prstGeom>
-          <a:ln>
-            <a:noFill/>
-          </a:ln>
-        </p:spPr>
-      </p:pic>
-      <p:pic>
-        <p:nvPicPr>
-          <p:cNvPr id="97" name="" descr=""/>
-          <p:cNvPicPr/>
-          <p:nvPr/>
-        </p:nvPicPr>
-        <p:blipFill>
-          <a:blip r:embed="rId16"/>
-          <a:stretch/>
-        </p:blipFill>
-        <p:spPr>
-          <a:xfrm>
-            <a:off x="26151840" y="30165840"/>
-            <a:ext cx="3089160" cy="740880"/>
-          </a:xfrm>
-          <a:prstGeom prst="rect">
-            <a:avLst/>
-          </a:prstGeom>
-          <a:ln>
-            <a:noFill/>
-          </a:ln>
-        </p:spPr>
-      </p:pic>
-      <p:pic>
-        <p:nvPicPr>
-          <p:cNvPr id="98" name="" descr=""/>
-          <p:cNvPicPr/>
-          <p:nvPr/>
-        </p:nvPicPr>
-        <p:blipFill>
-          <a:blip r:embed="rId17"/>
-          <a:stretch/>
-        </p:blipFill>
-        <p:spPr>
-          <a:xfrm>
-            <a:off x="29626560" y="28924560"/>
-            <a:ext cx="2483640" cy="884880"/>
-          </a:xfrm>
-          <a:prstGeom prst="rect">
-            <a:avLst/>
-          </a:prstGeom>
-          <a:ln>
-            <a:noFill/>
-          </a:ln>
-        </p:spPr>
-      </p:pic>
-      <p:pic>
-        <p:nvPicPr>
-          <p:cNvPr id="99" name="" descr=""/>
-          <p:cNvPicPr/>
-          <p:nvPr/>
-        </p:nvPicPr>
-        <p:blipFill>
-          <a:blip r:embed="rId18"/>
-          <a:stretch/>
-        </p:blipFill>
-        <p:spPr>
-          <a:xfrm>
-            <a:off x="29432880" y="29986560"/>
-            <a:ext cx="2936880" cy="1141920"/>
-          </a:xfrm>
-          <a:prstGeom prst="rect">
-            <a:avLst/>
-          </a:prstGeom>
-          <a:ln>
-            <a:noFill/>
-          </a:ln>
-        </p:spPr>
-      </p:pic>
-      <p:pic>
-        <p:nvPicPr>
-          <p:cNvPr id="100" name="" descr=""/>
-          <p:cNvPicPr/>
-          <p:nvPr/>
-        </p:nvPicPr>
-        <p:blipFill>
-          <a:blip r:embed="rId19"/>
-          <a:stretch/>
-        </p:blipFill>
-        <p:spPr>
-          <a:xfrm>
-            <a:off x="26954640" y="31164480"/>
-            <a:ext cx="1848960" cy="1386720"/>
-          </a:xfrm>
-          <a:prstGeom prst="rect">
-            <a:avLst/>
-          </a:prstGeom>
-          <a:ln>
-            <a:noFill/>
-          </a:ln>
-        </p:spPr>
-      </p:pic>
-      <p:pic>
-        <p:nvPicPr>
-          <p:cNvPr id="101" name="" descr=""/>
-          <p:cNvPicPr/>
-          <p:nvPr/>
-        </p:nvPicPr>
-        <p:blipFill>
-          <a:blip r:embed="rId20"/>
-          <a:srcRect l="0" t="10526" r="0" b="20999"/>
-          <a:stretch/>
-        </p:blipFill>
-        <p:spPr>
-          <a:xfrm>
-            <a:off x="29556720" y="31272480"/>
-            <a:ext cx="2813040" cy="1188360"/>
-          </a:xfrm>
-          <a:prstGeom prst="rect">
-            <a:avLst/>
-          </a:prstGeom>
-          <a:ln>
-            <a:noFill/>
-          </a:ln>
-        </p:spPr>
-      </p:pic>
     </p:spTree>
   </p:cSld>
   <mc:AlternateContent>

</xml_diff>

<commit_message>
added abbreviated coeff map
</commit_message>
<xml_diff>
--- a/presentation/Fred_Berendse_poster_draft.pptx
+++ b/presentation/Fred_Berendse_poster_draft.pptx
@@ -34,7 +34,7 @@
       </p:grpSpPr>
       <p:sp>
         <p:nvSpPr>
-          <p:cNvPr id="42" name="PlaceHolder 1"/>
+          <p:cNvPr id="40" name="PlaceHolder 1"/>
           <p:cNvSpPr>
             <a:spLocks noGrp="1"/>
           </p:cNvSpPr>
@@ -71,7 +71,7 @@
       </p:sp>
       <p:sp>
         <p:nvSpPr>
-          <p:cNvPr id="43" name="PlaceHolder 2"/>
+          <p:cNvPr id="41" name="PlaceHolder 2"/>
           <p:cNvSpPr>
             <a:spLocks noGrp="1"/>
           </p:cNvSpPr>
@@ -107,7 +107,7 @@
       </p:sp>
       <p:sp>
         <p:nvSpPr>
-          <p:cNvPr id="44" name="PlaceHolder 3"/>
+          <p:cNvPr id="42" name="PlaceHolder 3"/>
           <p:cNvSpPr>
             <a:spLocks noGrp="1"/>
           </p:cNvSpPr>
@@ -133,7 +133,7 @@
               <a:rPr b="0" lang="en-US" sz="1400" spc="-1" strike="noStrike">
                 <a:latin typeface="Times New Roman"/>
               </a:rPr>
-              <a:t> </a:t>
+              <a:t>&lt;header&gt;</a:t>
             </a:r>
             <a:endParaRPr b="0" lang="en-US" sz="1400" spc="-1" strike="noStrike">
               <a:latin typeface="Times New Roman"/>
@@ -143,7 +143,7 @@
       </p:sp>
       <p:sp>
         <p:nvSpPr>
-          <p:cNvPr id="45" name="PlaceHolder 4"/>
+          <p:cNvPr id="43" name="PlaceHolder 4"/>
           <p:cNvSpPr>
             <a:spLocks noGrp="1"/>
           </p:cNvSpPr>
@@ -170,7 +170,7 @@
               <a:rPr b="0" lang="en-US" sz="1400" spc="-1" strike="noStrike">
                 <a:latin typeface="Times New Roman"/>
               </a:rPr>
-              <a:t> </a:t>
+              <a:t>&lt;date/time&gt;</a:t>
             </a:r>
             <a:endParaRPr b="0" lang="en-US" sz="1400" spc="-1" strike="noStrike">
               <a:latin typeface="Times New Roman"/>
@@ -180,7 +180,7 @@
       </p:sp>
       <p:sp>
         <p:nvSpPr>
-          <p:cNvPr id="46" name="PlaceHolder 5"/>
+          <p:cNvPr id="44" name="PlaceHolder 5"/>
           <p:cNvSpPr>
             <a:spLocks noGrp="1"/>
           </p:cNvSpPr>
@@ -206,7 +206,7 @@
               <a:rPr b="0" lang="en-US" sz="1400" spc="-1" strike="noStrike">
                 <a:latin typeface="Times New Roman"/>
               </a:rPr>
-              <a:t> </a:t>
+              <a:t>&lt;footer&gt;</a:t>
             </a:r>
             <a:endParaRPr b="0" lang="en-US" sz="1400" spc="-1" strike="noStrike">
               <a:latin typeface="Times New Roman"/>
@@ -216,7 +216,7 @@
       </p:sp>
       <p:sp>
         <p:nvSpPr>
-          <p:cNvPr id="47" name="PlaceHolder 6"/>
+          <p:cNvPr id="45" name="PlaceHolder 6"/>
           <p:cNvSpPr>
             <a:spLocks noGrp="1"/>
           </p:cNvSpPr>
@@ -239,11 +239,11 @@
           </a:bodyPr>
           <a:p>
             <a:pPr algn="r"/>
-            <a:fld id="{B6C0F865-424B-46A9-A667-05AA100337E3}" type="slidenum">
+            <a:fld id="{D949BBD3-AD94-484D-9988-0B63BFA28EFF}" type="slidenum">
               <a:rPr b="0" lang="en-US" sz="1400" spc="-1" strike="noStrike">
                 <a:latin typeface="Times New Roman"/>
               </a:rPr>
-              <a:t>1</a:t>
+              <a:t>&lt;number&gt;</a:t>
             </a:fld>
             <a:endParaRPr b="0" lang="en-US" sz="1400" spc="-1" strike="noStrike">
               <a:latin typeface="Times New Roman"/>
@@ -276,14 +276,14 @@
       </p:grpSpPr>
       <p:sp>
         <p:nvSpPr>
-          <p:cNvPr id="104" name="CustomShape 1"/>
+          <p:cNvPr id="103" name="CustomShape 1"/>
           <p:cNvSpPr/>
           <p:nvPr/>
         </p:nvSpPr>
         <p:spPr>
           <a:xfrm>
             <a:off x="3884760" y="8685360"/>
-            <a:ext cx="2970360" cy="455760"/>
+            <a:ext cx="2970000" cy="455400"/>
           </a:xfrm>
           <a:prstGeom prst="rect">
             <a:avLst/>
@@ -309,14 +309,14 @@
                 <a:spcPct val="100000"/>
               </a:lnSpc>
             </a:pPr>
-            <a:fld id="{1BF90776-9083-4C5A-BA61-63CE1955CF1A}" type="slidenum">
+            <a:fld id="{63583F1A-A327-4B8D-8614-34398C414F5C}" type="slidenum">
               <a:rPr b="0" lang="en-US" sz="1200" spc="-1" strike="noStrike">
                 <a:solidFill>
                   <a:srgbClr val="000000"/>
                 </a:solidFill>
                 <a:latin typeface="Arial"/>
               </a:rPr>
-              <a:t>1</a:t>
+              <a:t>&lt;number&gt;</a:t>
             </a:fld>
             <a:endParaRPr b="0" lang="en-US" sz="1200" spc="-1" strike="noStrike">
               <a:latin typeface="Arial"/>
@@ -326,7 +326,7 @@
       </p:sp>
       <p:sp>
         <p:nvSpPr>
-          <p:cNvPr id="105" name="PlaceHolder 2"/>
+          <p:cNvPr id="104" name="PlaceHolder 2"/>
           <p:cNvSpPr>
             <a:spLocks noGrp="1"/>
           </p:cNvSpPr>
@@ -337,16 +337,16 @@
         <p:spPr>
           <a:xfrm>
             <a:off x="1143000" y="685800"/>
-            <a:ext cx="4570560" cy="3427560"/>
-          </a:xfrm>
-          <a:prstGeom prst="rect">
-            <a:avLst/>
-          </a:prstGeom>
-        </p:spPr>
-      </p:sp>
-      <p:sp>
-        <p:nvSpPr>
-          <p:cNvPr id="106" name="PlaceHolder 3"/>
+            <a:ext cx="4570200" cy="3427200"/>
+          </a:xfrm>
+          <a:prstGeom prst="rect">
+            <a:avLst/>
+          </a:prstGeom>
+        </p:spPr>
+      </p:sp>
+      <p:sp>
+        <p:nvSpPr>
+          <p:cNvPr id="105" name="PlaceHolder 3"/>
           <p:cNvSpPr>
             <a:spLocks noGrp="1"/>
           </p:cNvSpPr>
@@ -357,7 +357,7 @@
         <p:spPr>
           <a:xfrm>
             <a:off x="685800" y="4343400"/>
-            <a:ext cx="5484960" cy="4113360"/>
+            <a:ext cx="5484600" cy="4113000"/>
           </a:xfrm>
           <a:prstGeom prst="rect">
             <a:avLst/>
@@ -420,7 +420,7 @@
       </p:grpSpPr>
       <p:sp>
         <p:nvSpPr>
-          <p:cNvPr id="27" name="PlaceHolder 1"/>
+          <p:cNvPr id="25" name="PlaceHolder 1"/>
           <p:cNvSpPr>
             <a:spLocks noGrp="1"/>
           </p:cNvSpPr>
@@ -451,7 +451,7 @@
       </p:sp>
       <p:sp>
         <p:nvSpPr>
-          <p:cNvPr id="28" name="PlaceHolder 2"/>
+          <p:cNvPr id="26" name="PlaceHolder 2"/>
           <p:cNvSpPr>
             <a:spLocks noGrp="1"/>
           </p:cNvSpPr>
@@ -481,7 +481,7 @@
       </p:sp>
       <p:sp>
         <p:nvSpPr>
-          <p:cNvPr id="29" name="PlaceHolder 3"/>
+          <p:cNvPr id="27" name="PlaceHolder 3"/>
           <p:cNvSpPr>
             <a:spLocks noGrp="1"/>
           </p:cNvSpPr>
@@ -533,7 +533,7 @@
       </p:grpSpPr>
       <p:sp>
         <p:nvSpPr>
-          <p:cNvPr id="30" name="PlaceHolder 1"/>
+          <p:cNvPr id="28" name="PlaceHolder 1"/>
           <p:cNvSpPr>
             <a:spLocks noGrp="1"/>
           </p:cNvSpPr>
@@ -564,7 +564,7 @@
       </p:sp>
       <p:sp>
         <p:nvSpPr>
-          <p:cNvPr id="31" name="PlaceHolder 2"/>
+          <p:cNvPr id="29" name="PlaceHolder 2"/>
           <p:cNvSpPr>
             <a:spLocks noGrp="1"/>
           </p:cNvSpPr>
@@ -594,7 +594,7 @@
       </p:sp>
       <p:sp>
         <p:nvSpPr>
-          <p:cNvPr id="32" name="PlaceHolder 3"/>
+          <p:cNvPr id="30" name="PlaceHolder 3"/>
           <p:cNvSpPr>
             <a:spLocks noGrp="1"/>
           </p:cNvSpPr>
@@ -624,7 +624,7 @@
       </p:sp>
       <p:sp>
         <p:nvSpPr>
-          <p:cNvPr id="33" name="PlaceHolder 4"/>
+          <p:cNvPr id="31" name="PlaceHolder 4"/>
           <p:cNvSpPr>
             <a:spLocks noGrp="1"/>
           </p:cNvSpPr>
@@ -654,7 +654,7 @@
       </p:sp>
       <p:sp>
         <p:nvSpPr>
-          <p:cNvPr id="34" name="PlaceHolder 5"/>
+          <p:cNvPr id="32" name="PlaceHolder 5"/>
           <p:cNvSpPr>
             <a:spLocks noGrp="1"/>
           </p:cNvSpPr>
@@ -706,7 +706,7 @@
       </p:grpSpPr>
       <p:sp>
         <p:nvSpPr>
-          <p:cNvPr id="35" name="PlaceHolder 1"/>
+          <p:cNvPr id="33" name="PlaceHolder 1"/>
           <p:cNvSpPr>
             <a:spLocks noGrp="1"/>
           </p:cNvSpPr>
@@ -737,7 +737,7 @@
       </p:sp>
       <p:sp>
         <p:nvSpPr>
-          <p:cNvPr id="36" name="PlaceHolder 2"/>
+          <p:cNvPr id="34" name="PlaceHolder 2"/>
           <p:cNvSpPr>
             <a:spLocks noGrp="1"/>
           </p:cNvSpPr>
@@ -767,7 +767,7 @@
       </p:sp>
       <p:sp>
         <p:nvSpPr>
-          <p:cNvPr id="37" name="PlaceHolder 3"/>
+          <p:cNvPr id="35" name="PlaceHolder 3"/>
           <p:cNvSpPr>
             <a:spLocks noGrp="1"/>
           </p:cNvSpPr>
@@ -797,7 +797,7 @@
       </p:sp>
       <p:sp>
         <p:nvSpPr>
-          <p:cNvPr id="38" name="PlaceHolder 4"/>
+          <p:cNvPr id="36" name="PlaceHolder 4"/>
           <p:cNvSpPr>
             <a:spLocks noGrp="1"/>
           </p:cNvSpPr>
@@ -827,7 +827,7 @@
       </p:sp>
       <p:sp>
         <p:nvSpPr>
-          <p:cNvPr id="39" name="PlaceHolder 5"/>
+          <p:cNvPr id="37" name="PlaceHolder 5"/>
           <p:cNvSpPr>
             <a:spLocks noGrp="1"/>
           </p:cNvSpPr>
@@ -857,7 +857,7 @@
       </p:sp>
       <p:sp>
         <p:nvSpPr>
-          <p:cNvPr id="40" name="PlaceHolder 6"/>
+          <p:cNvPr id="38" name="PlaceHolder 6"/>
           <p:cNvSpPr>
             <a:spLocks noGrp="1"/>
           </p:cNvSpPr>
@@ -887,7 +887,7 @@
       </p:sp>
       <p:sp>
         <p:nvSpPr>
-          <p:cNvPr id="41" name="PlaceHolder 7"/>
+          <p:cNvPr id="39" name="PlaceHolder 7"/>
           <p:cNvSpPr>
             <a:spLocks noGrp="1"/>
           </p:cNvSpPr>
@@ -939,7 +939,7 @@
       </p:grpSpPr>
       <p:sp>
         <p:nvSpPr>
-          <p:cNvPr id="6" name="PlaceHolder 1"/>
+          <p:cNvPr id="4" name="PlaceHolder 1"/>
           <p:cNvSpPr>
             <a:spLocks noGrp="1"/>
           </p:cNvSpPr>
@@ -970,7 +970,7 @@
       </p:sp>
       <p:sp>
         <p:nvSpPr>
-          <p:cNvPr id="7" name="PlaceHolder 2"/>
+          <p:cNvPr id="5" name="PlaceHolder 2"/>
           <p:cNvSpPr>
             <a:spLocks noGrp="1"/>
           </p:cNvSpPr>
@@ -1023,7 +1023,7 @@
       </p:grpSpPr>
       <p:sp>
         <p:nvSpPr>
-          <p:cNvPr id="8" name="PlaceHolder 1"/>
+          <p:cNvPr id="6" name="PlaceHolder 1"/>
           <p:cNvSpPr>
             <a:spLocks noGrp="1"/>
           </p:cNvSpPr>
@@ -1054,7 +1054,7 @@
       </p:sp>
       <p:sp>
         <p:nvSpPr>
-          <p:cNvPr id="9" name="PlaceHolder 2"/>
+          <p:cNvPr id="7" name="PlaceHolder 2"/>
           <p:cNvSpPr>
             <a:spLocks noGrp="1"/>
           </p:cNvSpPr>
@@ -1106,7 +1106,7 @@
       </p:grpSpPr>
       <p:sp>
         <p:nvSpPr>
-          <p:cNvPr id="10" name="PlaceHolder 1"/>
+          <p:cNvPr id="8" name="PlaceHolder 1"/>
           <p:cNvSpPr>
             <a:spLocks noGrp="1"/>
           </p:cNvSpPr>
@@ -1137,7 +1137,7 @@
       </p:sp>
       <p:sp>
         <p:nvSpPr>
-          <p:cNvPr id="11" name="PlaceHolder 2"/>
+          <p:cNvPr id="9" name="PlaceHolder 2"/>
           <p:cNvSpPr>
             <a:spLocks noGrp="1"/>
           </p:cNvSpPr>
@@ -1167,7 +1167,7 @@
       </p:sp>
       <p:sp>
         <p:nvSpPr>
-          <p:cNvPr id="12" name="PlaceHolder 3"/>
+          <p:cNvPr id="10" name="PlaceHolder 3"/>
           <p:cNvSpPr>
             <a:spLocks noGrp="1"/>
           </p:cNvSpPr>
@@ -1219,7 +1219,7 @@
       </p:grpSpPr>
       <p:sp>
         <p:nvSpPr>
-          <p:cNvPr id="13" name="PlaceHolder 1"/>
+          <p:cNvPr id="11" name="PlaceHolder 1"/>
           <p:cNvSpPr>
             <a:spLocks noGrp="1"/>
           </p:cNvSpPr>
@@ -1272,7 +1272,7 @@
       </p:grpSpPr>
       <p:sp>
         <p:nvSpPr>
-          <p:cNvPr id="14" name="PlaceHolder 1"/>
+          <p:cNvPr id="12" name="PlaceHolder 1"/>
           <p:cNvSpPr>
             <a:spLocks noGrp="1"/>
           </p:cNvSpPr>
@@ -1325,7 +1325,7 @@
       </p:grpSpPr>
       <p:sp>
         <p:nvSpPr>
-          <p:cNvPr id="15" name="PlaceHolder 1"/>
+          <p:cNvPr id="13" name="PlaceHolder 1"/>
           <p:cNvSpPr>
             <a:spLocks noGrp="1"/>
           </p:cNvSpPr>
@@ -1356,7 +1356,7 @@
       </p:sp>
       <p:sp>
         <p:nvSpPr>
-          <p:cNvPr id="16" name="PlaceHolder 2"/>
+          <p:cNvPr id="14" name="PlaceHolder 2"/>
           <p:cNvSpPr>
             <a:spLocks noGrp="1"/>
           </p:cNvSpPr>
@@ -1386,7 +1386,7 @@
       </p:sp>
       <p:sp>
         <p:nvSpPr>
-          <p:cNvPr id="17" name="PlaceHolder 3"/>
+          <p:cNvPr id="15" name="PlaceHolder 3"/>
           <p:cNvSpPr>
             <a:spLocks noGrp="1"/>
           </p:cNvSpPr>
@@ -1416,7 +1416,7 @@
       </p:sp>
       <p:sp>
         <p:nvSpPr>
-          <p:cNvPr id="18" name="PlaceHolder 4"/>
+          <p:cNvPr id="16" name="PlaceHolder 4"/>
           <p:cNvSpPr>
             <a:spLocks noGrp="1"/>
           </p:cNvSpPr>
@@ -1468,7 +1468,7 @@
       </p:grpSpPr>
       <p:sp>
         <p:nvSpPr>
-          <p:cNvPr id="19" name="PlaceHolder 1"/>
+          <p:cNvPr id="17" name="PlaceHolder 1"/>
           <p:cNvSpPr>
             <a:spLocks noGrp="1"/>
           </p:cNvSpPr>
@@ -1499,7 +1499,7 @@
       </p:sp>
       <p:sp>
         <p:nvSpPr>
-          <p:cNvPr id="20" name="PlaceHolder 2"/>
+          <p:cNvPr id="18" name="PlaceHolder 2"/>
           <p:cNvSpPr>
             <a:spLocks noGrp="1"/>
           </p:cNvSpPr>
@@ -1529,7 +1529,7 @@
       </p:sp>
       <p:sp>
         <p:nvSpPr>
-          <p:cNvPr id="21" name="PlaceHolder 3"/>
+          <p:cNvPr id="19" name="PlaceHolder 3"/>
           <p:cNvSpPr>
             <a:spLocks noGrp="1"/>
           </p:cNvSpPr>
@@ -1559,7 +1559,7 @@
       </p:sp>
       <p:sp>
         <p:nvSpPr>
-          <p:cNvPr id="22" name="PlaceHolder 4"/>
+          <p:cNvPr id="20" name="PlaceHolder 4"/>
           <p:cNvSpPr>
             <a:spLocks noGrp="1"/>
           </p:cNvSpPr>
@@ -1611,7 +1611,7 @@
       </p:grpSpPr>
       <p:sp>
         <p:nvSpPr>
-          <p:cNvPr id="23" name="PlaceHolder 1"/>
+          <p:cNvPr id="21" name="PlaceHolder 1"/>
           <p:cNvSpPr>
             <a:spLocks noGrp="1"/>
           </p:cNvSpPr>
@@ -1642,7 +1642,7 @@
       </p:sp>
       <p:sp>
         <p:nvSpPr>
-          <p:cNvPr id="24" name="PlaceHolder 2"/>
+          <p:cNvPr id="22" name="PlaceHolder 2"/>
           <p:cNvSpPr>
             <a:spLocks noGrp="1"/>
           </p:cNvSpPr>
@@ -1672,7 +1672,7 @@
       </p:sp>
       <p:sp>
         <p:nvSpPr>
-          <p:cNvPr id="25" name="PlaceHolder 3"/>
+          <p:cNvPr id="23" name="PlaceHolder 3"/>
           <p:cNvSpPr>
             <a:spLocks noGrp="1"/>
           </p:cNvSpPr>
@@ -1702,7 +1702,7 @@
       </p:sp>
       <p:sp>
         <p:nvSpPr>
-          <p:cNvPr id="26" name="PlaceHolder 4"/>
+          <p:cNvPr id="24" name="PlaceHolder 4"/>
           <p:cNvSpPr>
             <a:spLocks noGrp="1"/>
           </p:cNvSpPr>
@@ -1771,8 +1771,8 @@
         </p:blipFill>
         <p:spPr>
           <a:xfrm rot="16200000">
-            <a:off x="-9245520" y="16460640"/>
-            <a:ext cx="15365520" cy="1560600"/>
+            <a:off x="-9245520" y="16461000"/>
+            <a:ext cx="15365160" cy="1560240"/>
           </a:xfrm>
           <a:prstGeom prst="rect">
             <a:avLst/>
@@ -1794,8 +1794,8 @@
         </p:blipFill>
         <p:spPr>
           <a:xfrm rot="5400000">
-            <a:off x="37771200" y="16459200"/>
-            <a:ext cx="15365520" cy="1560600"/>
+            <a:off x="37771560" y="16459200"/>
+            <a:ext cx="15365160" cy="1560240"/>
           </a:xfrm>
           <a:prstGeom prst="rect">
             <a:avLst/>
@@ -1818,7 +1818,7 @@
         <p:spPr>
           <a:xfrm>
             <a:off x="57240" y="33426360"/>
-            <a:ext cx="43775640" cy="2017800"/>
+            <a:ext cx="43775280" cy="2017440"/>
           </a:xfrm>
           <a:prstGeom prst="rect">
             <a:avLst/>
@@ -1837,7 +1837,7 @@
         <p:spPr>
           <a:xfrm>
             <a:off x="57240" y="33998040"/>
-            <a:ext cx="21944160" cy="1268640"/>
+            <a:ext cx="21943800" cy="1268280"/>
           </a:xfrm>
           <a:prstGeom prst="rect">
             <a:avLst/>
@@ -1882,222 +1882,6 @@
               <a:t>Template ID: greenapple  Size: 36x48</a:t>
             </a:r>
             <a:endParaRPr b="0" lang="en-US" sz="6360" spc="-1" strike="noStrike">
-              <a:latin typeface="Arial"/>
-            </a:endParaRPr>
-          </a:p>
-        </p:txBody>
-      </p:sp>
-      <p:sp>
-        <p:nvSpPr>
-          <p:cNvPr id="4" name="PlaceHolder 2"/>
-          <p:cNvSpPr>
-            <a:spLocks noGrp="1"/>
-          </p:cNvSpPr>
-          <p:nvPr>
-            <p:ph type="title"/>
-          </p:nvPr>
-        </p:nvSpPr>
-        <p:spPr>
-          <a:xfrm>
-            <a:off x="2194560" y="1313280"/>
-            <a:ext cx="39501720" cy="5496840"/>
-          </a:xfrm>
-          <a:prstGeom prst="rect">
-            <a:avLst/>
-          </a:prstGeom>
-        </p:spPr>
-        <p:txBody>
-          <a:bodyPr lIns="0" rIns="0" tIns="0" bIns="0" anchor="ctr">
-            <a:noAutofit/>
-          </a:bodyPr>
-          <a:p>
-            <a:pPr algn="ctr"/>
-            <a:r>
-              <a:rPr b="0" lang="en-US" sz="4400" spc="-1" strike="noStrike">
-                <a:latin typeface="Arial"/>
-              </a:rPr>
-              <a:t>Click to edit the title text format</a:t>
-            </a:r>
-            <a:endParaRPr b="0" lang="en-US" sz="4400" spc="-1" strike="noStrike">
-              <a:latin typeface="Arial"/>
-            </a:endParaRPr>
-          </a:p>
-        </p:txBody>
-      </p:sp>
-      <p:sp>
-        <p:nvSpPr>
-          <p:cNvPr id="5" name="PlaceHolder 3"/>
-          <p:cNvSpPr>
-            <a:spLocks noGrp="1"/>
-          </p:cNvSpPr>
-          <p:nvPr>
-            <p:ph type="body"/>
-          </p:nvPr>
-        </p:nvSpPr>
-        <p:spPr>
-          <a:xfrm>
-            <a:off x="2194560" y="7702560"/>
-            <a:ext cx="39501720" cy="19092240"/>
-          </a:xfrm>
-          <a:prstGeom prst="rect">
-            <a:avLst/>
-          </a:prstGeom>
-        </p:spPr>
-        <p:txBody>
-          <a:bodyPr lIns="0" rIns="0" tIns="0" bIns="0">
-            <a:normAutofit/>
-          </a:bodyPr>
-          <a:p>
-            <a:pPr marL="432000" indent="-324000">
-              <a:spcBef>
-                <a:spcPts val="1417"/>
-              </a:spcBef>
-              <a:buClr>
-                <a:srgbClr val="000000"/>
-              </a:buClr>
-              <a:buSzPct val="45000"/>
-              <a:buFont typeface="Wingdings" charset="2"/>
-              <a:buChar char=""/>
-            </a:pPr>
-            <a:r>
-              <a:rPr b="0" lang="en-US" sz="3200" spc="-1" strike="noStrike">
-                <a:latin typeface="Arial"/>
-              </a:rPr>
-              <a:t>Click to edit the outline text format</a:t>
-            </a:r>
-            <a:endParaRPr b="0" lang="en-US" sz="3200" spc="-1" strike="noStrike">
-              <a:latin typeface="Arial"/>
-            </a:endParaRPr>
-          </a:p>
-          <a:p>
-            <a:pPr lvl="1" marL="864000" indent="-324000">
-              <a:spcBef>
-                <a:spcPts val="1134"/>
-              </a:spcBef>
-              <a:buClr>
-                <a:srgbClr val="000000"/>
-              </a:buClr>
-              <a:buSzPct val="75000"/>
-              <a:buFont typeface="Symbol" charset="2"/>
-              <a:buChar char=""/>
-            </a:pPr>
-            <a:r>
-              <a:rPr b="0" lang="en-US" sz="2800" spc="-1" strike="noStrike">
-                <a:latin typeface="Arial"/>
-              </a:rPr>
-              <a:t>Second Outline Level</a:t>
-            </a:r>
-            <a:endParaRPr b="0" lang="en-US" sz="2800" spc="-1" strike="noStrike">
-              <a:latin typeface="Arial"/>
-            </a:endParaRPr>
-          </a:p>
-          <a:p>
-            <a:pPr lvl="2" marL="1296000" indent="-288000">
-              <a:spcBef>
-                <a:spcPts val="850"/>
-              </a:spcBef>
-              <a:buClr>
-                <a:srgbClr val="000000"/>
-              </a:buClr>
-              <a:buSzPct val="45000"/>
-              <a:buFont typeface="Wingdings" charset="2"/>
-              <a:buChar char=""/>
-            </a:pPr>
-            <a:r>
-              <a:rPr b="0" lang="en-US" sz="2400" spc="-1" strike="noStrike">
-                <a:latin typeface="Arial"/>
-              </a:rPr>
-              <a:t>Third Outline Level</a:t>
-            </a:r>
-            <a:endParaRPr b="0" lang="en-US" sz="2400" spc="-1" strike="noStrike">
-              <a:latin typeface="Arial"/>
-            </a:endParaRPr>
-          </a:p>
-          <a:p>
-            <a:pPr lvl="3" marL="1728000" indent="-216000">
-              <a:spcBef>
-                <a:spcPts val="567"/>
-              </a:spcBef>
-              <a:buClr>
-                <a:srgbClr val="000000"/>
-              </a:buClr>
-              <a:buSzPct val="75000"/>
-              <a:buFont typeface="Symbol" charset="2"/>
-              <a:buChar char=""/>
-            </a:pPr>
-            <a:r>
-              <a:rPr b="0" lang="en-US" sz="2000" spc="-1" strike="noStrike">
-                <a:latin typeface="Arial"/>
-              </a:rPr>
-              <a:t>Fourth Outline Level</a:t>
-            </a:r>
-            <a:endParaRPr b="0" lang="en-US" sz="2000" spc="-1" strike="noStrike">
-              <a:latin typeface="Arial"/>
-            </a:endParaRPr>
-          </a:p>
-          <a:p>
-            <a:pPr lvl="4" marL="2160000" indent="-216000">
-              <a:spcBef>
-                <a:spcPts val="283"/>
-              </a:spcBef>
-              <a:buClr>
-                <a:srgbClr val="000000"/>
-              </a:buClr>
-              <a:buSzPct val="45000"/>
-              <a:buFont typeface="Wingdings" charset="2"/>
-              <a:buChar char=""/>
-            </a:pPr>
-            <a:r>
-              <a:rPr b="0" lang="en-US" sz="2000" spc="-1" strike="noStrike">
-                <a:latin typeface="Arial"/>
-              </a:rPr>
-              <a:t>Fifth Outline Level</a:t>
-            </a:r>
-            <a:endParaRPr b="0" lang="en-US" sz="2000" spc="-1" strike="noStrike">
-              <a:latin typeface="Arial"/>
-            </a:endParaRPr>
-          </a:p>
-          <a:p>
-            <a:pPr lvl="5" marL="2592000" indent="-216000">
-              <a:spcBef>
-                <a:spcPts val="283"/>
-              </a:spcBef>
-              <a:buClr>
-                <a:srgbClr val="000000"/>
-              </a:buClr>
-              <a:buSzPct val="45000"/>
-              <a:buFont typeface="Wingdings" charset="2"/>
-              <a:buChar char=""/>
-            </a:pPr>
-            <a:r>
-              <a:rPr b="0" lang="en-US" sz="2000" spc="-1" strike="noStrike">
-                <a:latin typeface="Arial"/>
-              </a:rPr>
-              <a:t>Sixth Outline Level</a:t>
-            </a:r>
-            <a:endParaRPr b="0" lang="en-US" sz="2000" spc="-1" strike="noStrike">
-              <a:latin typeface="Arial"/>
-            </a:endParaRPr>
-          </a:p>
-          <a:p>
-            <a:pPr lvl="6" marL="3024000" indent="-216000">
-              <a:spcBef>
-                <a:spcPts val="283"/>
-              </a:spcBef>
-              <a:buClr>
-                <a:srgbClr val="000000"/>
-              </a:buClr>
-              <a:buSzPct val="45000"/>
-              <a:buFont typeface="Wingdings" charset="2"/>
-              <a:buChar char=""/>
-            </a:pPr>
-            <a:r>
-              <a:rPr b="0" lang="en-US" sz="2000" spc="-1" strike="noStrike">
-                <a:latin typeface="Arial"/>
-              </a:rPr>
-              <a:t>Seventh Outline Level</a:t>
-            </a:r>
-            <a:endParaRPr b="0" lang="en-US" sz="2000" spc="-1" strike="noStrike">
               <a:latin typeface="Arial"/>
             </a:endParaRPr>
           </a:p>
@@ -2142,14 +1926,14 @@
       </p:grpSpPr>
       <p:sp>
         <p:nvSpPr>
-          <p:cNvPr id="48" name="CustomShape 1"/>
+          <p:cNvPr id="46" name="CustomShape 1"/>
           <p:cNvSpPr/>
           <p:nvPr/>
         </p:nvSpPr>
         <p:spPr>
           <a:xfrm>
             <a:off x="68400" y="76320"/>
-            <a:ext cx="43729560" cy="3884760"/>
+            <a:ext cx="43729200" cy="3884400"/>
           </a:xfrm>
           <a:prstGeom prst="rect">
             <a:avLst/>
@@ -2218,14 +2002,14 @@
       </p:sp>
       <p:sp>
         <p:nvSpPr>
-          <p:cNvPr id="49" name="CustomShape 2"/>
+          <p:cNvPr id="47" name="CustomShape 2"/>
           <p:cNvSpPr/>
           <p:nvPr/>
         </p:nvSpPr>
         <p:spPr>
           <a:xfrm>
             <a:off x="0" y="4343400"/>
-            <a:ext cx="10356840" cy="1027440"/>
+            <a:ext cx="10356480" cy="1027080"/>
           </a:xfrm>
           <a:prstGeom prst="rect">
             <a:avLst/>
@@ -2274,14 +2058,14 @@
       </p:sp>
       <p:sp>
         <p:nvSpPr>
-          <p:cNvPr id="50" name="CustomShape 3"/>
+          <p:cNvPr id="48" name="CustomShape 3"/>
           <p:cNvSpPr/>
           <p:nvPr/>
         </p:nvSpPr>
         <p:spPr>
           <a:xfrm>
             <a:off x="0" y="11179080"/>
-            <a:ext cx="10356840" cy="1027440"/>
+            <a:ext cx="10356480" cy="1027080"/>
           </a:xfrm>
           <a:prstGeom prst="rect">
             <a:avLst/>
@@ -2330,14 +2114,14 @@
       </p:sp>
       <p:sp>
         <p:nvSpPr>
-          <p:cNvPr id="51" name="CustomShape 4"/>
+          <p:cNvPr id="49" name="CustomShape 4"/>
           <p:cNvSpPr/>
           <p:nvPr/>
         </p:nvSpPr>
         <p:spPr>
           <a:xfrm>
             <a:off x="11177640" y="4343400"/>
-            <a:ext cx="10356840" cy="1027440"/>
+            <a:ext cx="10356480" cy="1027080"/>
           </a:xfrm>
           <a:prstGeom prst="rect">
             <a:avLst/>
@@ -2386,14 +2170,14 @@
       </p:sp>
       <p:sp>
         <p:nvSpPr>
-          <p:cNvPr id="52" name="CustomShape 5"/>
+          <p:cNvPr id="50" name="CustomShape 5"/>
           <p:cNvSpPr/>
           <p:nvPr/>
         </p:nvSpPr>
         <p:spPr>
           <a:xfrm>
             <a:off x="22355280" y="4343400"/>
-            <a:ext cx="10356840" cy="1027440"/>
+            <a:ext cx="10356480" cy="1027080"/>
           </a:xfrm>
           <a:prstGeom prst="rect">
             <a:avLst/>
@@ -2442,14 +2226,14 @@
       </p:sp>
       <p:sp>
         <p:nvSpPr>
-          <p:cNvPr id="53" name="CustomShape 6"/>
+          <p:cNvPr id="51" name="CustomShape 6"/>
           <p:cNvSpPr/>
           <p:nvPr/>
         </p:nvSpPr>
         <p:spPr>
           <a:xfrm>
             <a:off x="22131360" y="27592920"/>
-            <a:ext cx="10368000" cy="1027440"/>
+            <a:ext cx="10367640" cy="1027080"/>
           </a:xfrm>
           <a:prstGeom prst="rect">
             <a:avLst/>
@@ -2498,14 +2282,14 @@
       </p:sp>
       <p:sp>
         <p:nvSpPr>
-          <p:cNvPr id="54" name="CustomShape 7"/>
+          <p:cNvPr id="52" name="CustomShape 7"/>
           <p:cNvSpPr/>
           <p:nvPr/>
         </p:nvSpPr>
         <p:spPr>
           <a:xfrm>
             <a:off x="33284160" y="17373600"/>
-            <a:ext cx="10356840" cy="1027440"/>
+            <a:ext cx="10356480" cy="1027080"/>
           </a:xfrm>
           <a:prstGeom prst="rect">
             <a:avLst/>
@@ -2554,14 +2338,14 @@
       </p:sp>
       <p:sp>
         <p:nvSpPr>
-          <p:cNvPr id="55" name="CustomShape 8"/>
+          <p:cNvPr id="53" name="CustomShape 8"/>
           <p:cNvSpPr/>
           <p:nvPr/>
         </p:nvSpPr>
         <p:spPr>
           <a:xfrm>
             <a:off x="33442560" y="27140400"/>
-            <a:ext cx="10356840" cy="1027440"/>
+            <a:ext cx="10356480" cy="1027080"/>
           </a:xfrm>
           <a:prstGeom prst="rect">
             <a:avLst/>
@@ -2610,14 +2394,14 @@
       </p:sp>
       <p:sp>
         <p:nvSpPr>
-          <p:cNvPr id="56" name="CustomShape 9"/>
+          <p:cNvPr id="54" name="CustomShape 9"/>
           <p:cNvSpPr/>
           <p:nvPr/>
         </p:nvSpPr>
         <p:spPr>
           <a:xfrm>
             <a:off x="0" y="17695080"/>
-            <a:ext cx="10356840" cy="1027440"/>
+            <a:ext cx="10356480" cy="1027080"/>
           </a:xfrm>
           <a:prstGeom prst="rect">
             <a:avLst/>
@@ -2666,14 +2450,14 @@
       </p:sp>
       <p:sp>
         <p:nvSpPr>
-          <p:cNvPr id="57" name="CustomShape 10"/>
+          <p:cNvPr id="55" name="CustomShape 10"/>
           <p:cNvSpPr/>
           <p:nvPr/>
         </p:nvSpPr>
         <p:spPr>
           <a:xfrm>
             <a:off x="711360" y="5715000"/>
-            <a:ext cx="9447480" cy="5257800"/>
+            <a:ext cx="9447120" cy="5257800"/>
           </a:xfrm>
           <a:prstGeom prst="rect">
             <a:avLst/>
@@ -2720,14 +2504,14 @@
       </p:sp>
       <p:sp>
         <p:nvSpPr>
-          <p:cNvPr id="58" name="CustomShape 11"/>
+          <p:cNvPr id="56" name="CustomShape 11"/>
           <p:cNvSpPr/>
           <p:nvPr/>
         </p:nvSpPr>
         <p:spPr>
           <a:xfrm>
             <a:off x="11277720" y="5715000"/>
-            <a:ext cx="10209960" cy="1684080"/>
+            <a:ext cx="10209600" cy="1684080"/>
           </a:xfrm>
           <a:prstGeom prst="rect">
             <a:avLst/>
@@ -2748,7 +2532,7 @@
             <a:spAutoFit/>
           </a:bodyPr>
           <a:p>
-            <a:pPr marL="216000" indent="-215280">
+            <a:pPr marL="216000" indent="-214920">
               <a:lnSpc>
                 <a:spcPct val="100000"/>
               </a:lnSpc>
@@ -2802,14 +2586,14 @@
       </p:sp>
       <p:sp>
         <p:nvSpPr>
-          <p:cNvPr id="59" name="CustomShape 12"/>
+          <p:cNvPr id="57" name="CustomShape 12"/>
           <p:cNvSpPr/>
           <p:nvPr/>
         </p:nvSpPr>
         <p:spPr>
           <a:xfrm>
             <a:off x="-349200" y="11927880"/>
-            <a:ext cx="9955440" cy="5459400"/>
+            <a:ext cx="9955080" cy="5459400"/>
           </a:xfrm>
           <a:prstGeom prst="rect">
             <a:avLst/>
@@ -2843,7 +2627,7 @@
             </a:endParaRPr>
           </a:p>
           <a:p>
-            <a:pPr lvl="1" marL="1271520" indent="-412920">
+            <a:pPr lvl="1" marL="1271520" indent="-412560">
               <a:lnSpc>
                 <a:spcPct val="100000"/>
               </a:lnSpc>
@@ -2871,7 +2655,7 @@
             </a:endParaRPr>
           </a:p>
           <a:p>
-            <a:pPr lvl="1" marL="1271520" indent="-412920">
+            <a:pPr lvl="1" marL="1271520" indent="-412560">
               <a:lnSpc>
                 <a:spcPct val="100000"/>
               </a:lnSpc>
@@ -2902,14 +2686,14 @@
       </p:sp>
       <p:sp>
         <p:nvSpPr>
-          <p:cNvPr id="60" name="CustomShape 13"/>
+          <p:cNvPr id="58" name="CustomShape 13"/>
           <p:cNvSpPr/>
           <p:nvPr/>
         </p:nvSpPr>
         <p:spPr>
           <a:xfrm>
             <a:off x="33467040" y="18653760"/>
-            <a:ext cx="9965160" cy="1899720"/>
+            <a:ext cx="9964800" cy="1899720"/>
           </a:xfrm>
           <a:prstGeom prst="rect">
             <a:avLst/>
@@ -2953,14 +2737,14 @@
       </p:sp>
       <p:sp>
         <p:nvSpPr>
-          <p:cNvPr id="61" name="CustomShape 14"/>
+          <p:cNvPr id="59" name="CustomShape 14"/>
           <p:cNvSpPr/>
           <p:nvPr/>
         </p:nvSpPr>
         <p:spPr>
           <a:xfrm>
             <a:off x="22302000" y="12877200"/>
-            <a:ext cx="10341360" cy="2284560"/>
+            <a:ext cx="10341000" cy="2284200"/>
           </a:xfrm>
           <a:prstGeom prst="rect">
             <a:avLst/>
@@ -3027,7 +2811,7 @@
       </p:sp>
       <p:pic>
         <p:nvPicPr>
-          <p:cNvPr id="62" name="Picture 2" descr=""/>
+          <p:cNvPr id="60" name="Picture 2" descr=""/>
           <p:cNvPicPr/>
           <p:nvPr/>
         </p:nvPicPr>
@@ -3038,7 +2822,7 @@
         <p:spPr>
           <a:xfrm>
             <a:off x="838080" y="603000"/>
-            <a:ext cx="1522440" cy="2824560"/>
+            <a:ext cx="1522080" cy="2824200"/>
           </a:xfrm>
           <a:prstGeom prst="rect">
             <a:avLst/>
@@ -3050,7 +2834,7 @@
       </p:pic>
       <p:sp>
         <p:nvSpPr>
-          <p:cNvPr id="63" name="CustomShape 15"/>
+          <p:cNvPr id="61" name="CustomShape 15"/>
           <p:cNvSpPr/>
           <p:nvPr/>
         </p:nvSpPr>
@@ -3101,7 +2885,7 @@
       </p:sp>
       <p:pic>
         <p:nvPicPr>
-          <p:cNvPr id="64" name="Picture 387" descr=""/>
+          <p:cNvPr id="62" name="Picture 387" descr=""/>
           <p:cNvPicPr/>
           <p:nvPr/>
         </p:nvPicPr>
@@ -3112,7 +2896,7 @@
         <p:spPr>
           <a:xfrm>
             <a:off x="33022440" y="671400"/>
-            <a:ext cx="698760" cy="698760"/>
+            <a:ext cx="698400" cy="698400"/>
           </a:xfrm>
           <a:prstGeom prst="rect">
             <a:avLst/>
@@ -3124,7 +2908,7 @@
       </p:pic>
       <p:pic>
         <p:nvPicPr>
-          <p:cNvPr id="65" name="Picture 388" descr=""/>
+          <p:cNvPr id="63" name="Picture 388" descr=""/>
           <p:cNvPicPr/>
           <p:nvPr/>
         </p:nvPicPr>
@@ -3135,7 +2919,7 @@
         <p:spPr>
           <a:xfrm>
             <a:off x="33050160" y="2826720"/>
-            <a:ext cx="704880" cy="533160"/>
+            <a:ext cx="704520" cy="532800"/>
           </a:xfrm>
           <a:prstGeom prst="rect">
             <a:avLst/>
@@ -3147,14 +2931,14 @@
       </p:pic>
       <p:sp>
         <p:nvSpPr>
-          <p:cNvPr id="66" name="CustomShape 16"/>
+          <p:cNvPr id="64" name="CustomShape 16"/>
           <p:cNvSpPr/>
           <p:nvPr/>
         </p:nvSpPr>
         <p:spPr>
           <a:xfrm>
             <a:off x="33070680" y="1600200"/>
-            <a:ext cx="1293840" cy="912600"/>
+            <a:ext cx="1293480" cy="912600"/>
           </a:xfrm>
           <a:prstGeom prst="rect">
             <a:avLst/>
@@ -3198,7 +2982,7 @@
       </p:sp>
       <p:sp>
         <p:nvSpPr>
-          <p:cNvPr id="67" name="CustomShape 17"/>
+          <p:cNvPr id="65" name="CustomShape 17"/>
           <p:cNvSpPr/>
           <p:nvPr/>
         </p:nvSpPr>
@@ -3249,14 +3033,14 @@
       </p:sp>
       <p:sp>
         <p:nvSpPr>
-          <p:cNvPr id="68" name="CustomShape 18"/>
+          <p:cNvPr id="66" name="CustomShape 18"/>
           <p:cNvSpPr/>
           <p:nvPr/>
         </p:nvSpPr>
         <p:spPr>
           <a:xfrm>
             <a:off x="34160400" y="2666880"/>
-            <a:ext cx="7216200" cy="759960"/>
+            <a:ext cx="7215840" cy="759960"/>
           </a:xfrm>
           <a:prstGeom prst="rect">
             <a:avLst/>
@@ -3300,14 +3084,14 @@
       </p:sp>
       <p:sp>
         <p:nvSpPr>
-          <p:cNvPr id="69" name="CustomShape 19"/>
+          <p:cNvPr id="67" name="CustomShape 19"/>
           <p:cNvSpPr/>
           <p:nvPr/>
         </p:nvSpPr>
         <p:spPr>
           <a:xfrm>
             <a:off x="742320" y="19227600"/>
-            <a:ext cx="9498240" cy="6206040"/>
+            <a:ext cx="9497880" cy="6206040"/>
           </a:xfrm>
           <a:prstGeom prst="rect">
             <a:avLst/>
@@ -3354,7 +3138,7 @@
       </p:sp>
       <p:pic>
         <p:nvPicPr>
-          <p:cNvPr id="70" name="" descr=""/>
+          <p:cNvPr id="68" name="" descr=""/>
           <p:cNvPicPr/>
           <p:nvPr/>
         </p:nvPicPr>
@@ -3365,7 +3149,7 @@
         <p:spPr>
           <a:xfrm>
             <a:off x="10436400" y="25467480"/>
-            <a:ext cx="10411200" cy="7031520"/>
+            <a:ext cx="10410840" cy="7031160"/>
           </a:xfrm>
           <a:prstGeom prst="rect">
             <a:avLst/>
@@ -3377,7 +3161,7 @@
       </p:pic>
       <p:pic>
         <p:nvPicPr>
-          <p:cNvPr id="71" name="" descr=""/>
+          <p:cNvPr id="69" name="" descr=""/>
           <p:cNvPicPr/>
           <p:nvPr/>
         </p:nvPicPr>
@@ -3389,7 +3173,7 @@
         <p:spPr>
           <a:xfrm>
             <a:off x="731520" y="25536240"/>
-            <a:ext cx="9475200" cy="6948720"/>
+            <a:ext cx="9474840" cy="6948360"/>
           </a:xfrm>
           <a:prstGeom prst="rect">
             <a:avLst/>
@@ -3401,14 +3185,14 @@
       </p:pic>
       <p:sp>
         <p:nvSpPr>
-          <p:cNvPr id="72" name="CustomShape 20"/>
+          <p:cNvPr id="70" name="CustomShape 20"/>
           <p:cNvSpPr/>
           <p:nvPr/>
         </p:nvSpPr>
         <p:spPr>
           <a:xfrm>
             <a:off x="11155680" y="6503400"/>
-            <a:ext cx="10361880" cy="1816920"/>
+            <a:ext cx="10361520" cy="1268280"/>
           </a:xfrm>
           <a:prstGeom prst="rect">
             <a:avLst/>
@@ -3445,7 +3229,7 @@
                 <a:latin typeface="Gill Sans"/>
                 <a:ea typeface="Arial"/>
               </a:rPr>
-              <a:t>Five-fold cross validation was used to optimize the Lasso shrinkage parameter to 0.08.</a:t>
+              <a:t>Below are the most important coefficients after Lasso Regularization:</a:t>
             </a:r>
             <a:endParaRPr b="0" lang="en-US" sz="3600" spc="-1" strike="noStrike">
               <a:latin typeface="Arial"/>
@@ -3453,40 +3237,16 @@
           </a:p>
         </p:txBody>
       </p:sp>
-      <p:pic>
-        <p:nvPicPr>
-          <p:cNvPr id="73" name="" descr=""/>
-          <p:cNvPicPr/>
-          <p:nvPr/>
-        </p:nvPicPr>
-        <p:blipFill>
-          <a:blip r:embed="rId6"/>
-          <a:srcRect l="0" t="0" r="8947" b="0"/>
-          <a:stretch/>
-        </p:blipFill>
-        <p:spPr>
-          <a:xfrm>
-            <a:off x="11176920" y="8745840"/>
-            <a:ext cx="10310760" cy="7302960"/>
-          </a:xfrm>
-          <a:prstGeom prst="rect">
-            <a:avLst/>
-          </a:prstGeom>
-          <a:ln>
-            <a:noFill/>
-          </a:ln>
-        </p:spPr>
-      </p:pic>
-      <p:sp>
-        <p:nvSpPr>
-          <p:cNvPr id="74" name="CustomShape 21"/>
+      <p:sp>
+        <p:nvSpPr>
+          <p:cNvPr id="71" name="CustomShape 21"/>
           <p:cNvSpPr/>
           <p:nvPr/>
         </p:nvSpPr>
         <p:spPr>
           <a:xfrm>
-            <a:off x="13167360" y="8147520"/>
-            <a:ext cx="7040160" cy="597600"/>
+            <a:off x="11277720" y="16285680"/>
+            <a:ext cx="10209600" cy="777240"/>
           </a:xfrm>
           <a:prstGeom prst="rect">
             <a:avLst/>
@@ -3503,65 +3263,11 @@
           <a:fontRef idx="minor"/>
         </p:style>
         <p:txBody>
-          <a:bodyPr lIns="171360" rIns="171360" tIns="85680" bIns="85680">
-            <a:spAutoFit/>
-          </a:bodyPr>
-          <a:p>
-            <a:pPr>
-              <a:lnSpc>
-                <a:spcPct val="100000"/>
-              </a:lnSpc>
-              <a:spcBef>
-                <a:spcPts val="2100"/>
-              </a:spcBef>
-            </a:pPr>
-            <a:r>
-              <a:rPr b="1" lang="en-US" sz="2800" spc="-1" strike="noStrike">
-                <a:solidFill>
-                  <a:srgbClr val="393939"/>
-                </a:solidFill>
-                <a:latin typeface="Gill Sans"/>
-                <a:ea typeface="Arial"/>
-              </a:rPr>
-              <a:t>Lasso Regression Coefficients</a:t>
-            </a:r>
-            <a:endParaRPr b="0" lang="en-US" sz="2800" spc="-1" strike="noStrike">
-              <a:latin typeface="Arial"/>
-            </a:endParaRPr>
-          </a:p>
-        </p:txBody>
-      </p:sp>
-      <p:sp>
-        <p:nvSpPr>
-          <p:cNvPr id="75" name="CustomShape 22"/>
-          <p:cNvSpPr/>
-          <p:nvPr/>
-        </p:nvSpPr>
-        <p:spPr>
-          <a:xfrm>
-            <a:off x="11277720" y="16285680"/>
-            <a:ext cx="10209960" cy="777240"/>
-          </a:xfrm>
-          <a:prstGeom prst="rect">
-            <a:avLst/>
-          </a:prstGeom>
-          <a:noFill/>
-          <a:ln>
-            <a:noFill/>
-          </a:ln>
-        </p:spPr>
-        <p:style>
-          <a:lnRef idx="0"/>
-          <a:fillRef idx="0"/>
-          <a:effectRef idx="0"/>
-          <a:fontRef idx="minor"/>
-        </p:style>
-        <p:txBody>
           <a:bodyPr lIns="137160" rIns="137160" tIns="68760" bIns="68760">
             <a:spAutoFit/>
           </a:bodyPr>
           <a:p>
-            <a:pPr marL="216000" indent="-215280">
+            <a:pPr marL="216000" indent="-214920">
               <a:lnSpc>
                 <a:spcPct val="100000"/>
               </a:lnSpc>
@@ -3602,14 +3308,14 @@
       </p:sp>
       <p:sp>
         <p:nvSpPr>
-          <p:cNvPr id="76" name="CustomShape 23"/>
+          <p:cNvPr id="72" name="CustomShape 22"/>
           <p:cNvSpPr/>
           <p:nvPr/>
         </p:nvSpPr>
         <p:spPr>
           <a:xfrm>
             <a:off x="11237760" y="17130240"/>
-            <a:ext cx="10158480" cy="2284560"/>
+            <a:ext cx="10158120" cy="2284200"/>
           </a:xfrm>
           <a:prstGeom prst="rect">
             <a:avLst/>
@@ -3658,14 +3364,14 @@
         <mc:Choice xmlns:a14="http://schemas.microsoft.com/office/drawing/2010/main" Requires="a14">
           <p:sp>
             <p:nvSpPr>
-              <p:cNvPr id="77" name="Formula 24"/>
+              <p:cNvPr id="73" name="Formula 23"/>
               <p:cNvSpPr txBox="1"/>
               <p:nvPr/>
             </p:nvSpPr>
             <p:spPr>
               <a:xfrm>
                 <a:off x="13990320" y="18870840"/>
-                <a:ext cx="592200" cy="543960"/>
+                <a:ext cx="591840" cy="543600"/>
               </a:xfrm>
               <a:prstGeom prst="rect">
                 <a:avLst/>
@@ -3695,202 +3401,16 @@
         </mc:Choice>
         <mc:Fallback/>
       </mc:AlternateContent>
-      <p:grpSp>
-        <p:nvGrpSpPr>
-          <p:cNvPr id="78" name="Group 25"/>
-          <p:cNvGrpSpPr/>
-          <p:nvPr/>
-        </p:nvGrpSpPr>
-        <p:grpSpPr>
-          <a:xfrm>
-            <a:off x="10881360" y="19571040"/>
-            <a:ext cx="10423440" cy="5892480"/>
-            <a:chOff x="10881360" y="19571040"/>
-            <a:chExt cx="10423440" cy="5892480"/>
-          </a:xfrm>
-        </p:grpSpPr>
-        <p:pic>
-          <p:nvPicPr>
-            <p:cNvPr id="79" name="" descr=""/>
-            <p:cNvPicPr/>
-            <p:nvPr/>
-          </p:nvPicPr>
-          <p:blipFill>
-            <a:blip r:embed="rId7"/>
-            <a:srcRect l="0" t="0" r="0" b="50432"/>
-            <a:stretch/>
-          </p:blipFill>
-          <p:spPr>
-            <a:xfrm>
-              <a:off x="10881360" y="20252520"/>
-              <a:ext cx="10423440" cy="5211000"/>
-            </a:xfrm>
-            <a:prstGeom prst="rect">
-              <a:avLst/>
-            </a:prstGeom>
-            <a:ln>
-              <a:noFill/>
-            </a:ln>
-          </p:spPr>
-        </p:pic>
-        <p:sp>
-          <p:nvSpPr>
-            <p:cNvPr id="80" name="CustomShape 26"/>
-            <p:cNvSpPr/>
-            <p:nvPr/>
-          </p:nvSpPr>
-          <p:spPr>
-            <a:xfrm>
-              <a:off x="13529160" y="19571040"/>
-              <a:ext cx="5785560" cy="597600"/>
-            </a:xfrm>
-            <a:prstGeom prst="rect">
-              <a:avLst/>
-            </a:prstGeom>
-            <a:noFill/>
-            <a:ln>
-              <a:noFill/>
-            </a:ln>
-          </p:spPr>
-          <p:style>
-            <a:lnRef idx="0"/>
-            <a:fillRef idx="0"/>
-            <a:effectRef idx="0"/>
-            <a:fontRef idx="minor"/>
-          </p:style>
-          <p:txBody>
-            <a:bodyPr lIns="171360" rIns="171360" tIns="85680" bIns="85680">
-              <a:spAutoFit/>
-            </a:bodyPr>
-            <a:p>
-              <a:pPr>
-                <a:lnSpc>
-                  <a:spcPct val="100000"/>
-                </a:lnSpc>
-                <a:spcBef>
-                  <a:spcPts val="2100"/>
-                </a:spcBef>
-              </a:pPr>
-              <a:r>
-                <a:rPr b="1" lang="en-US" sz="2800" spc="-1" strike="noStrike">
-                  <a:solidFill>
-                    <a:srgbClr val="393939"/>
-                  </a:solidFill>
-                  <a:latin typeface="Gill Sans"/>
-                  <a:ea typeface="Arial"/>
-                </a:rPr>
-                <a:t>Partial Dependence Plots</a:t>
-              </a:r>
-              <a:endParaRPr b="0" lang="en-US" sz="2800" spc="-1" strike="noStrike">
-                <a:latin typeface="Arial"/>
-              </a:endParaRPr>
-            </a:p>
-          </p:txBody>
-        </p:sp>
-      </p:grpSp>
-      <p:grpSp>
-        <p:nvGrpSpPr>
-          <p:cNvPr id="81" name="Group 27"/>
-          <p:cNvGrpSpPr/>
-          <p:nvPr/>
-        </p:nvGrpSpPr>
-        <p:grpSpPr>
-          <a:xfrm>
-            <a:off x="22399920" y="5760720"/>
-            <a:ext cx="10243440" cy="6125760"/>
-            <a:chOff x="22399920" y="5760720"/>
-            <a:chExt cx="10243440" cy="6125760"/>
-          </a:xfrm>
-        </p:grpSpPr>
-        <p:pic>
-          <p:nvPicPr>
-            <p:cNvPr id="82" name="" descr=""/>
-            <p:cNvPicPr/>
-            <p:nvPr/>
-          </p:nvPicPr>
-          <p:blipFill>
-            <a:blip r:embed="rId8"/>
-            <a:srcRect l="0" t="49985" r="0" b="-927"/>
-            <a:stretch/>
-          </p:blipFill>
-          <p:spPr>
-            <a:xfrm>
-              <a:off x="22399920" y="6452640"/>
-              <a:ext cx="10243440" cy="5433840"/>
-            </a:xfrm>
-            <a:prstGeom prst="rect">
-              <a:avLst/>
-            </a:prstGeom>
-            <a:ln>
-              <a:noFill/>
-            </a:ln>
-          </p:spPr>
-        </p:pic>
-        <p:sp>
-          <p:nvSpPr>
-            <p:cNvPr id="83" name="CustomShape 28"/>
-            <p:cNvSpPr/>
-            <p:nvPr/>
-          </p:nvSpPr>
-          <p:spPr>
-            <a:xfrm>
-              <a:off x="24916320" y="5760720"/>
-              <a:ext cx="5685480" cy="597600"/>
-            </a:xfrm>
-            <a:prstGeom prst="rect">
-              <a:avLst/>
-            </a:prstGeom>
-            <a:noFill/>
-            <a:ln>
-              <a:noFill/>
-            </a:ln>
-          </p:spPr>
-          <p:style>
-            <a:lnRef idx="0"/>
-            <a:fillRef idx="0"/>
-            <a:effectRef idx="0"/>
-            <a:fontRef idx="minor"/>
-          </p:style>
-          <p:txBody>
-            <a:bodyPr lIns="171360" rIns="171360" tIns="85680" bIns="85680">
-              <a:spAutoFit/>
-            </a:bodyPr>
-            <a:p>
-              <a:pPr>
-                <a:lnSpc>
-                  <a:spcPct val="100000"/>
-                </a:lnSpc>
-                <a:spcBef>
-                  <a:spcPts val="2100"/>
-                </a:spcBef>
-              </a:pPr>
-              <a:r>
-                <a:rPr b="1" lang="en-US" sz="2800" spc="-1" strike="noStrike">
-                  <a:solidFill>
-                    <a:srgbClr val="393939"/>
-                  </a:solidFill>
-                  <a:latin typeface="Gill Sans"/>
-                  <a:ea typeface="Arial"/>
-                </a:rPr>
-                <a:t>Partial Dependence Plots</a:t>
-              </a:r>
-              <a:endParaRPr b="0" lang="en-US" sz="2800" spc="-1" strike="noStrike">
-                <a:latin typeface="Arial"/>
-              </a:endParaRPr>
-            </a:p>
-          </p:txBody>
-        </p:sp>
-      </p:grpSp>
-      <p:sp>
-        <p:nvSpPr>
-          <p:cNvPr id="84" name="CustomShape 29"/>
+      <p:sp>
+        <p:nvSpPr>
+          <p:cNvPr id="74" name="CustomShape 24"/>
           <p:cNvSpPr/>
           <p:nvPr/>
         </p:nvSpPr>
         <p:spPr>
           <a:xfrm>
             <a:off x="22368600" y="12000960"/>
-            <a:ext cx="10209960" cy="777240"/>
+            <a:ext cx="10209600" cy="777240"/>
           </a:xfrm>
           <a:prstGeom prst="rect">
             <a:avLst/>
@@ -3911,7 +3431,7 @@
             <a:spAutoFit/>
           </a:bodyPr>
           <a:p>
-            <a:pPr marL="216000" indent="-215280">
+            <a:pPr marL="216000" indent="-214920">
               <a:lnSpc>
                 <a:spcPct val="100000"/>
               </a:lnSpc>
@@ -3952,14 +3472,14 @@
       </p:sp>
       <p:sp>
         <p:nvSpPr>
-          <p:cNvPr id="85" name="CustomShape 30"/>
+          <p:cNvPr id="75" name="CustomShape 25"/>
           <p:cNvSpPr/>
           <p:nvPr/>
         </p:nvSpPr>
         <p:spPr>
           <a:xfrm>
             <a:off x="33764040" y="28352160"/>
-            <a:ext cx="9685440" cy="1899720"/>
+            <a:ext cx="9685080" cy="1899720"/>
           </a:xfrm>
           <a:prstGeom prst="rect">
             <a:avLst/>
@@ -4003,14 +3523,14 @@
       </p:sp>
       <p:sp>
         <p:nvSpPr>
-          <p:cNvPr id="86" name="CustomShape 31"/>
+          <p:cNvPr id="76" name="CustomShape 26"/>
           <p:cNvSpPr/>
           <p:nvPr/>
         </p:nvSpPr>
         <p:spPr>
           <a:xfrm>
             <a:off x="33733440" y="30384360"/>
-            <a:ext cx="9752040" cy="2350800"/>
+            <a:ext cx="9751680" cy="2350440"/>
           </a:xfrm>
           <a:prstGeom prst="rect">
             <a:avLst/>
@@ -4031,7 +3551,7 @@
             <a:spAutoFit/>
           </a:bodyPr>
           <a:p>
-            <a:pPr marL="343080" indent="-341640">
+            <a:pPr marL="343080" indent="-341280">
               <a:lnSpc>
                 <a:spcPct val="100000"/>
               </a:lnSpc>
@@ -4079,7 +3599,7 @@
             </a:endParaRPr>
           </a:p>
           <a:p>
-            <a:pPr marL="343080" indent="-341640">
+            <a:pPr marL="343080" indent="-341280">
               <a:lnSpc>
                 <a:spcPct val="100000"/>
               </a:lnSpc>
@@ -4107,7 +3627,7 @@
             </a:endParaRPr>
           </a:p>
           <a:p>
-            <a:pPr marL="343080" indent="-341640">
+            <a:pPr marL="343080" indent="-341280">
               <a:lnSpc>
                 <a:spcPct val="100000"/>
               </a:lnSpc>
@@ -4138,14 +3658,14 @@
       </p:sp>
       <p:sp>
         <p:nvSpPr>
-          <p:cNvPr id="87" name="CustomShape 32"/>
+          <p:cNvPr id="77" name="CustomShape 27"/>
           <p:cNvSpPr/>
           <p:nvPr/>
         </p:nvSpPr>
         <p:spPr>
           <a:xfrm>
             <a:off x="33684120" y="4333680"/>
-            <a:ext cx="9990720" cy="1027440"/>
+            <a:ext cx="9990360" cy="1027080"/>
           </a:xfrm>
           <a:prstGeom prst="rect">
             <a:avLst/>
@@ -4194,7 +3714,76 @@
       </p:sp>
       <p:pic>
         <p:nvPicPr>
-          <p:cNvPr id="88" name="" descr=""/>
+          <p:cNvPr id="78" name="" descr=""/>
+          <p:cNvPicPr/>
+          <p:nvPr/>
+        </p:nvPicPr>
+        <p:blipFill>
+          <a:blip r:embed="rId6"/>
+          <a:stretch/>
+        </p:blipFill>
+        <p:spPr>
+          <a:xfrm>
+            <a:off x="22128480" y="31377600"/>
+            <a:ext cx="3885120" cy="808560"/>
+          </a:xfrm>
+          <a:prstGeom prst="rect">
+            <a:avLst/>
+          </a:prstGeom>
+          <a:ln>
+            <a:noFill/>
+          </a:ln>
+        </p:spPr>
+      </p:pic>
+      <p:pic>
+        <p:nvPicPr>
+          <p:cNvPr id="79" name="" descr=""/>
+          <p:cNvPicPr/>
+          <p:nvPr/>
+        </p:nvPicPr>
+        <p:blipFill>
+          <a:blip r:embed="rId7"/>
+          <a:stretch/>
+        </p:blipFill>
+        <p:spPr>
+          <a:xfrm>
+            <a:off x="22402800" y="28803600"/>
+            <a:ext cx="3180600" cy="1073880"/>
+          </a:xfrm>
+          <a:prstGeom prst="rect">
+            <a:avLst/>
+          </a:prstGeom>
+          <a:ln>
+            <a:noFill/>
+          </a:ln>
+        </p:spPr>
+      </p:pic>
+      <p:pic>
+        <p:nvPicPr>
+          <p:cNvPr id="80" name="" descr=""/>
+          <p:cNvPicPr/>
+          <p:nvPr/>
+        </p:nvPicPr>
+        <p:blipFill>
+          <a:blip r:embed="rId8"/>
+          <a:stretch/>
+        </p:blipFill>
+        <p:spPr>
+          <a:xfrm>
+            <a:off x="22774680" y="30041640"/>
+            <a:ext cx="2644920" cy="1047240"/>
+          </a:xfrm>
+          <a:prstGeom prst="rect">
+            <a:avLst/>
+          </a:prstGeom>
+          <a:ln>
+            <a:noFill/>
+          </a:ln>
+        </p:spPr>
+      </p:pic>
+      <p:pic>
+        <p:nvPicPr>
+          <p:cNvPr id="81" name="" descr=""/>
           <p:cNvPicPr/>
           <p:nvPr/>
         </p:nvPicPr>
@@ -4204,8 +3793,8 @@
         </p:blipFill>
         <p:spPr>
           <a:xfrm>
-            <a:off x="22128480" y="31377600"/>
-            <a:ext cx="3885480" cy="808920"/>
+            <a:off x="26517600" y="28803600"/>
+            <a:ext cx="2005560" cy="1079280"/>
           </a:xfrm>
           <a:prstGeom prst="rect">
             <a:avLst/>
@@ -4217,7 +3806,7 @@
       </p:pic>
       <p:pic>
         <p:nvPicPr>
-          <p:cNvPr id="89" name="" descr=""/>
+          <p:cNvPr id="82" name="" descr=""/>
           <p:cNvPicPr/>
           <p:nvPr/>
         </p:nvPicPr>
@@ -4227,8 +3816,8 @@
         </p:blipFill>
         <p:spPr>
           <a:xfrm>
-            <a:off x="22402800" y="28803600"/>
-            <a:ext cx="3180960" cy="1074240"/>
+            <a:off x="26151840" y="30165840"/>
+            <a:ext cx="3088440" cy="740160"/>
           </a:xfrm>
           <a:prstGeom prst="rect">
             <a:avLst/>
@@ -4240,7 +3829,7 @@
       </p:pic>
       <p:pic>
         <p:nvPicPr>
-          <p:cNvPr id="90" name="" descr=""/>
+          <p:cNvPr id="83" name="" descr=""/>
           <p:cNvPicPr/>
           <p:nvPr/>
         </p:nvPicPr>
@@ -4250,8 +3839,8 @@
         </p:blipFill>
         <p:spPr>
           <a:xfrm>
-            <a:off x="22774680" y="30041640"/>
-            <a:ext cx="2645280" cy="1047600"/>
+            <a:off x="29626560" y="28924560"/>
+            <a:ext cx="2482920" cy="884160"/>
           </a:xfrm>
           <a:prstGeom prst="rect">
             <a:avLst/>
@@ -4263,7 +3852,7 @@
       </p:pic>
       <p:pic>
         <p:nvPicPr>
-          <p:cNvPr id="91" name="" descr=""/>
+          <p:cNvPr id="84" name="" descr=""/>
           <p:cNvPicPr/>
           <p:nvPr/>
         </p:nvPicPr>
@@ -4273,8 +3862,8 @@
         </p:blipFill>
         <p:spPr>
           <a:xfrm>
-            <a:off x="26517600" y="28803600"/>
-            <a:ext cx="2005920" cy="1079640"/>
+            <a:off x="29432880" y="29986560"/>
+            <a:ext cx="2936160" cy="1141200"/>
           </a:xfrm>
           <a:prstGeom prst="rect">
             <a:avLst/>
@@ -4286,7 +3875,7 @@
       </p:pic>
       <p:pic>
         <p:nvPicPr>
-          <p:cNvPr id="92" name="" descr=""/>
+          <p:cNvPr id="85" name="" descr=""/>
           <p:cNvPicPr/>
           <p:nvPr/>
         </p:nvPicPr>
@@ -4296,8 +3885,8 @@
         </p:blipFill>
         <p:spPr>
           <a:xfrm>
-            <a:off x="26151840" y="30165840"/>
-            <a:ext cx="3088800" cy="740520"/>
+            <a:off x="26954640" y="31164480"/>
+            <a:ext cx="1848240" cy="1386000"/>
           </a:xfrm>
           <a:prstGeom prst="rect">
             <a:avLst/>
@@ -4309,18 +3898,19 @@
       </p:pic>
       <p:pic>
         <p:nvPicPr>
-          <p:cNvPr id="93" name="" descr=""/>
+          <p:cNvPr id="86" name="" descr=""/>
           <p:cNvPicPr/>
           <p:nvPr/>
         </p:nvPicPr>
         <p:blipFill>
           <a:blip r:embed="rId14"/>
+          <a:srcRect l="0" t="10526" r="0" b="20999"/>
           <a:stretch/>
         </p:blipFill>
         <p:spPr>
           <a:xfrm>
-            <a:off x="29626560" y="28924560"/>
-            <a:ext cx="2483280" cy="884520"/>
+            <a:off x="29556720" y="31272480"/>
+            <a:ext cx="2812320" cy="1187640"/>
           </a:xfrm>
           <a:prstGeom prst="rect">
             <a:avLst/>
@@ -4332,7 +3922,7 @@
       </p:pic>
       <p:pic>
         <p:nvPicPr>
-          <p:cNvPr id="94" name="" descr=""/>
+          <p:cNvPr id="87" name="" descr=""/>
           <p:cNvPicPr/>
           <p:nvPr/>
         </p:nvPicPr>
@@ -4342,8 +3932,8 @@
         </p:blipFill>
         <p:spPr>
           <a:xfrm>
-            <a:off x="29432880" y="29986560"/>
-            <a:ext cx="2936520" cy="1141560"/>
+            <a:off x="34107120" y="20692440"/>
+            <a:ext cx="8777880" cy="6267240"/>
           </a:xfrm>
           <a:prstGeom prst="rect">
             <a:avLst/>
@@ -4353,105 +3943,35 @@
           </a:ln>
         </p:spPr>
       </p:pic>
-      <p:pic>
-        <p:nvPicPr>
-          <p:cNvPr id="95" name="" descr=""/>
-          <p:cNvPicPr/>
-          <p:nvPr/>
-        </p:nvPicPr>
-        <p:blipFill>
-          <a:blip r:embed="rId16"/>
-          <a:stretch/>
-        </p:blipFill>
-        <p:spPr>
-          <a:xfrm>
-            <a:off x="26954640" y="31164480"/>
-            <a:ext cx="1848600" cy="1386360"/>
-          </a:xfrm>
-          <a:prstGeom prst="rect">
-            <a:avLst/>
-          </a:prstGeom>
-          <a:ln>
-            <a:noFill/>
-          </a:ln>
-        </p:spPr>
-      </p:pic>
-      <p:pic>
-        <p:nvPicPr>
-          <p:cNvPr id="96" name="" descr=""/>
-          <p:cNvPicPr/>
-          <p:nvPr/>
-        </p:nvPicPr>
-        <p:blipFill>
-          <a:blip r:embed="rId17"/>
-          <a:srcRect l="0" t="10526" r="0" b="20999"/>
-          <a:stretch/>
-        </p:blipFill>
-        <p:spPr>
-          <a:xfrm>
-            <a:off x="29556720" y="31272480"/>
-            <a:ext cx="2812680" cy="1188000"/>
-          </a:xfrm>
-          <a:prstGeom prst="rect">
-            <a:avLst/>
-          </a:prstGeom>
-          <a:ln>
-            <a:noFill/>
-          </a:ln>
-        </p:spPr>
-      </p:pic>
-      <p:pic>
-        <p:nvPicPr>
-          <p:cNvPr id="97" name="" descr=""/>
-          <p:cNvPicPr/>
-          <p:nvPr/>
-        </p:nvPicPr>
-        <p:blipFill>
-          <a:blip r:embed="rId18"/>
-          <a:stretch/>
-        </p:blipFill>
-        <p:spPr>
-          <a:xfrm>
-            <a:off x="34107120" y="20692440"/>
-            <a:ext cx="8778240" cy="6267600"/>
-          </a:xfrm>
-          <a:prstGeom prst="rect">
-            <a:avLst/>
-          </a:prstGeom>
-          <a:ln>
-            <a:noFill/>
-          </a:ln>
-        </p:spPr>
-      </p:pic>
       <p:grpSp>
         <p:nvGrpSpPr>
-          <p:cNvPr id="98" name="Group 33"/>
+          <p:cNvPr id="88" name="Group 28"/>
           <p:cNvGrpSpPr/>
           <p:nvPr/>
         </p:nvGrpSpPr>
         <p:grpSpPr>
           <a:xfrm>
             <a:off x="22585680" y="16916400"/>
-            <a:ext cx="9414000" cy="9741960"/>
+            <a:ext cx="9413640" cy="9741600"/>
             <a:chOff x="22585680" y="16916400"/>
-            <a:chExt cx="9414000" cy="9741960"/>
+            <a:chExt cx="9413640" cy="9741600"/>
           </a:xfrm>
         </p:grpSpPr>
         <p:pic>
           <p:nvPicPr>
-            <p:cNvPr id="99" name="" descr=""/>
+            <p:cNvPr id="89" name="" descr=""/>
             <p:cNvPicPr/>
             <p:nvPr/>
           </p:nvPicPr>
           <p:blipFill>
-            <a:blip r:embed="rId19"/>
+            <a:blip r:embed="rId16"/>
             <a:srcRect l="0" t="3024" r="0" b="0"/>
             <a:stretch/>
           </p:blipFill>
           <p:spPr>
             <a:xfrm>
               <a:off x="22585680" y="17519760"/>
-              <a:ext cx="9414000" cy="9138600"/>
+              <a:ext cx="9413640" cy="9138240"/>
             </a:xfrm>
             <a:prstGeom prst="rect">
               <a:avLst/>
@@ -4463,14 +3983,14 @@
         </p:pic>
         <p:sp>
           <p:nvSpPr>
-            <p:cNvPr id="100" name="CustomShape 34"/>
+            <p:cNvPr id="90" name="CustomShape 29"/>
             <p:cNvSpPr/>
             <p:nvPr/>
           </p:nvSpPr>
           <p:spPr>
             <a:xfrm>
               <a:off x="23389200" y="16916400"/>
-              <a:ext cx="8345880" cy="598320"/>
+              <a:ext cx="8345520" cy="597960"/>
             </a:xfrm>
             <a:prstGeom prst="rect">
               <a:avLst/>
@@ -4507,377 +4027,7 @@
                   <a:latin typeface="Gill Sans"/>
                   <a:ea typeface="Arial"/>
                 </a:rPr>
-                <a:t>C</a:t>
-              </a:r>
-              <a:r>
-                <a:rPr b="1" lang="en-US" sz="2800" spc="-1" strike="noStrike">
-                  <a:solidFill>
-                    <a:srgbClr val="393939"/>
-                  </a:solidFill>
-                  <a:latin typeface="Gill Sans"/>
-                  <a:ea typeface="Arial"/>
-                </a:rPr>
-                <a:t>o</a:t>
-              </a:r>
-              <a:r>
-                <a:rPr b="1" lang="en-US" sz="2800" spc="-1" strike="noStrike">
-                  <a:solidFill>
-                    <a:srgbClr val="393939"/>
-                  </a:solidFill>
-                  <a:latin typeface="Gill Sans"/>
-                  <a:ea typeface="Arial"/>
-                </a:rPr>
-                <a:t>e</a:t>
-              </a:r>
-              <a:r>
-                <a:rPr b="1" lang="en-US" sz="2800" spc="-1" strike="noStrike">
-                  <a:solidFill>
-                    <a:srgbClr val="393939"/>
-                  </a:solidFill>
-                  <a:latin typeface="Gill Sans"/>
-                  <a:ea typeface="Arial"/>
-                </a:rPr>
-                <a:t>f</a:t>
-              </a:r>
-              <a:r>
-                <a:rPr b="1" lang="en-US" sz="2800" spc="-1" strike="noStrike">
-                  <a:solidFill>
-                    <a:srgbClr val="393939"/>
-                  </a:solidFill>
-                  <a:latin typeface="Gill Sans"/>
-                  <a:ea typeface="Arial"/>
-                </a:rPr>
-                <a:t>f</a:t>
-              </a:r>
-              <a:r>
-                <a:rPr b="1" lang="en-US" sz="2800" spc="-1" strike="noStrike">
-                  <a:solidFill>
-                    <a:srgbClr val="393939"/>
-                  </a:solidFill>
-                  <a:latin typeface="Gill Sans"/>
-                  <a:ea typeface="Arial"/>
-                </a:rPr>
-                <a:t>i</a:t>
-              </a:r>
-              <a:r>
-                <a:rPr b="1" lang="en-US" sz="2800" spc="-1" strike="noStrike">
-                  <a:solidFill>
-                    <a:srgbClr val="393939"/>
-                  </a:solidFill>
-                  <a:latin typeface="Gill Sans"/>
-                  <a:ea typeface="Arial"/>
-                </a:rPr>
-                <a:t>c</a:t>
-              </a:r>
-              <a:r>
-                <a:rPr b="1" lang="en-US" sz="2800" spc="-1" strike="noStrike">
-                  <a:solidFill>
-                    <a:srgbClr val="393939"/>
-                  </a:solidFill>
-                  <a:latin typeface="Gill Sans"/>
-                  <a:ea typeface="Arial"/>
-                </a:rPr>
-                <a:t>i</a:t>
-              </a:r>
-              <a:r>
-                <a:rPr b="1" lang="en-US" sz="2800" spc="-1" strike="noStrike">
-                  <a:solidFill>
-                    <a:srgbClr val="393939"/>
-                  </a:solidFill>
-                  <a:latin typeface="Gill Sans"/>
-                  <a:ea typeface="Arial"/>
-                </a:rPr>
-                <a:t>e</a:t>
-              </a:r>
-              <a:r>
-                <a:rPr b="1" lang="en-US" sz="2800" spc="-1" strike="noStrike">
-                  <a:solidFill>
-                    <a:srgbClr val="393939"/>
-                  </a:solidFill>
-                  <a:latin typeface="Gill Sans"/>
-                  <a:ea typeface="Arial"/>
-                </a:rPr>
-                <a:t>n</a:t>
-              </a:r>
-              <a:r>
-                <a:rPr b="1" lang="en-US" sz="2800" spc="-1" strike="noStrike">
-                  <a:solidFill>
-                    <a:srgbClr val="393939"/>
-                  </a:solidFill>
-                  <a:latin typeface="Gill Sans"/>
-                  <a:ea typeface="Arial"/>
-                </a:rPr>
-                <a:t>t</a:t>
-              </a:r>
-              <a:r>
-                <a:rPr b="1" lang="en-US" sz="2800" spc="-1" strike="noStrike">
-                  <a:solidFill>
-                    <a:srgbClr val="393939"/>
-                  </a:solidFill>
-                  <a:latin typeface="Gill Sans"/>
-                  <a:ea typeface="Arial"/>
-                </a:rPr>
-                <a:t>s</a:t>
-              </a:r>
-              <a:r>
-                <a:rPr b="1" lang="en-US" sz="2800" spc="-1" strike="noStrike">
-                  <a:solidFill>
-                    <a:srgbClr val="393939"/>
-                  </a:solidFill>
-                  <a:latin typeface="Gill Sans"/>
-                  <a:ea typeface="Arial"/>
-                </a:rPr>
-                <a:t>:</a:t>
-              </a:r>
-              <a:r>
-                <a:rPr b="1" lang="en-US" sz="2800" spc="-1" strike="noStrike">
-                  <a:solidFill>
-                    <a:srgbClr val="393939"/>
-                  </a:solidFill>
-                  <a:latin typeface="Gill Sans"/>
-                  <a:ea typeface="Arial"/>
-                </a:rPr>
-                <a:t> </a:t>
-              </a:r>
-              <a:r>
-                <a:rPr b="1" lang="en-US" sz="2800" spc="-1" strike="noStrike">
-                  <a:solidFill>
-                    <a:srgbClr val="393939"/>
-                  </a:solidFill>
-                  <a:latin typeface="Gill Sans"/>
-                  <a:ea typeface="Arial"/>
-                </a:rPr>
-                <a:t>H</a:t>
-              </a:r>
-              <a:r>
-                <a:rPr b="1" lang="en-US" sz="2800" spc="-1" strike="noStrike">
-                  <a:solidFill>
-                    <a:srgbClr val="393939"/>
-                  </a:solidFill>
-                  <a:latin typeface="Gill Sans"/>
-                  <a:ea typeface="Arial"/>
-                </a:rPr>
-                <a:t>i</a:t>
-              </a:r>
-              <a:r>
-                <a:rPr b="1" lang="en-US" sz="2800" spc="-1" strike="noStrike">
-                  <a:solidFill>
-                    <a:srgbClr val="393939"/>
-                  </a:solidFill>
-                  <a:latin typeface="Gill Sans"/>
-                  <a:ea typeface="Arial"/>
-                </a:rPr>
-                <a:t>s</a:t>
-              </a:r>
-              <a:r>
-                <a:rPr b="1" lang="en-US" sz="2800" spc="-1" strike="noStrike">
-                  <a:solidFill>
-                    <a:srgbClr val="393939"/>
-                  </a:solidFill>
-                  <a:latin typeface="Gill Sans"/>
-                  <a:ea typeface="Arial"/>
-                </a:rPr>
-                <a:t>p</a:t>
-              </a:r>
-              <a:r>
-                <a:rPr b="1" lang="en-US" sz="2800" spc="-1" strike="noStrike">
-                  <a:solidFill>
-                    <a:srgbClr val="393939"/>
-                  </a:solidFill>
-                  <a:latin typeface="Gill Sans"/>
-                  <a:ea typeface="Arial"/>
-                </a:rPr>
-                <a:t>a</a:t>
-              </a:r>
-              <a:r>
-                <a:rPr b="1" lang="en-US" sz="2800" spc="-1" strike="noStrike">
-                  <a:solidFill>
-                    <a:srgbClr val="393939"/>
-                  </a:solidFill>
-                  <a:latin typeface="Gill Sans"/>
-                  <a:ea typeface="Arial"/>
-                </a:rPr>
-                <a:t>n</a:t>
-              </a:r>
-              <a:r>
-                <a:rPr b="1" lang="en-US" sz="2800" spc="-1" strike="noStrike">
-                  <a:solidFill>
-                    <a:srgbClr val="393939"/>
-                  </a:solidFill>
-                  <a:latin typeface="Gill Sans"/>
-                  <a:ea typeface="Arial"/>
-                </a:rPr>
-                <a:t>i</a:t>
-              </a:r>
-              <a:r>
-                <a:rPr b="1" lang="en-US" sz="2800" spc="-1" strike="noStrike">
-                  <a:solidFill>
-                    <a:srgbClr val="393939"/>
-                  </a:solidFill>
-                  <a:latin typeface="Gill Sans"/>
-                  <a:ea typeface="Arial"/>
-                </a:rPr>
-                <a:t>c</a:t>
-              </a:r>
-              <a:r>
-                <a:rPr b="1" lang="en-US" sz="2800" spc="-1" strike="noStrike">
-                  <a:solidFill>
-                    <a:srgbClr val="393939"/>
-                  </a:solidFill>
-                  <a:latin typeface="Gill Sans"/>
-                  <a:ea typeface="Arial"/>
-                </a:rPr>
-                <a:t> </a:t>
-              </a:r>
-              <a:r>
-                <a:rPr b="1" lang="en-US" sz="2800" spc="-1" strike="noStrike">
-                  <a:solidFill>
-                    <a:srgbClr val="393939"/>
-                  </a:solidFill>
-                  <a:latin typeface="Gill Sans"/>
-                  <a:ea typeface="Arial"/>
-                </a:rPr>
-                <a:t>G</a:t>
-              </a:r>
-              <a:r>
-                <a:rPr b="1" lang="en-US" sz="2800" spc="-1" strike="noStrike">
-                  <a:solidFill>
-                    <a:srgbClr val="393939"/>
-                  </a:solidFill>
-                  <a:latin typeface="Gill Sans"/>
-                  <a:ea typeface="Arial"/>
-                </a:rPr>
-                <a:t>r</a:t>
-              </a:r>
-              <a:r>
-                <a:rPr b="1" lang="en-US" sz="2800" spc="-1" strike="noStrike">
-                  <a:solidFill>
-                    <a:srgbClr val="393939"/>
-                  </a:solidFill>
-                  <a:latin typeface="Gill Sans"/>
-                  <a:ea typeface="Arial"/>
-                </a:rPr>
-                <a:t>a</a:t>
-              </a:r>
-              <a:r>
-                <a:rPr b="1" lang="en-US" sz="2800" spc="-1" strike="noStrike">
-                  <a:solidFill>
-                    <a:srgbClr val="393939"/>
-                  </a:solidFill>
-                  <a:latin typeface="Gill Sans"/>
-                  <a:ea typeface="Arial"/>
-                </a:rPr>
-                <a:t>d</a:t>
-              </a:r>
-              <a:r>
-                <a:rPr b="1" lang="en-US" sz="2800" spc="-1" strike="noStrike">
-                  <a:solidFill>
-                    <a:srgbClr val="393939"/>
-                  </a:solidFill>
-                  <a:latin typeface="Gill Sans"/>
-                  <a:ea typeface="Arial"/>
-                </a:rPr>
-                <a:t>u</a:t>
-              </a:r>
-              <a:r>
-                <a:rPr b="1" lang="en-US" sz="2800" spc="-1" strike="noStrike">
-                  <a:solidFill>
-                    <a:srgbClr val="393939"/>
-                  </a:solidFill>
-                  <a:latin typeface="Gill Sans"/>
-                  <a:ea typeface="Arial"/>
-                </a:rPr>
-                <a:t>a</a:t>
-              </a:r>
-              <a:r>
-                <a:rPr b="1" lang="en-US" sz="2800" spc="-1" strike="noStrike">
-                  <a:solidFill>
-                    <a:srgbClr val="393939"/>
-                  </a:solidFill>
-                  <a:latin typeface="Gill Sans"/>
-                  <a:ea typeface="Arial"/>
-                </a:rPr>
-                <a:t>t</a:t>
-              </a:r>
-              <a:r>
-                <a:rPr b="1" lang="en-US" sz="2800" spc="-1" strike="noStrike">
-                  <a:solidFill>
-                    <a:srgbClr val="393939"/>
-                  </a:solidFill>
-                  <a:latin typeface="Gill Sans"/>
-                  <a:ea typeface="Arial"/>
-                </a:rPr>
-                <a:t>i</a:t>
-              </a:r>
-              <a:r>
-                <a:rPr b="1" lang="en-US" sz="2800" spc="-1" strike="noStrike">
-                  <a:solidFill>
-                    <a:srgbClr val="393939"/>
-                  </a:solidFill>
-                  <a:latin typeface="Gill Sans"/>
-                  <a:ea typeface="Arial"/>
-                </a:rPr>
-                <a:t>o</a:t>
-              </a:r>
-              <a:r>
-                <a:rPr b="1" lang="en-US" sz="2800" spc="-1" strike="noStrike">
-                  <a:solidFill>
-                    <a:srgbClr val="393939"/>
-                  </a:solidFill>
-                  <a:latin typeface="Gill Sans"/>
-                  <a:ea typeface="Arial"/>
-                </a:rPr>
-                <a:t>n</a:t>
-              </a:r>
-              <a:r>
-                <a:rPr b="1" lang="en-US" sz="2800" spc="-1" strike="noStrike">
-                  <a:solidFill>
-                    <a:srgbClr val="393939"/>
-                  </a:solidFill>
-                  <a:latin typeface="Gill Sans"/>
-                  <a:ea typeface="Arial"/>
-                </a:rPr>
-                <a:t> </a:t>
-              </a:r>
-              <a:r>
-                <a:rPr b="1" lang="en-US" sz="2800" spc="-1" strike="noStrike">
-                  <a:solidFill>
-                    <a:srgbClr val="393939"/>
-                  </a:solidFill>
-                  <a:latin typeface="Gill Sans"/>
-                  <a:ea typeface="Arial"/>
-                </a:rPr>
-                <a:t>R</a:t>
-              </a:r>
-              <a:r>
-                <a:rPr b="1" lang="en-US" sz="2800" spc="-1" strike="noStrike">
-                  <a:solidFill>
-                    <a:srgbClr val="393939"/>
-                  </a:solidFill>
-                  <a:latin typeface="Gill Sans"/>
-                  <a:ea typeface="Arial"/>
-                </a:rPr>
-                <a:t>a</a:t>
-              </a:r>
-              <a:r>
-                <a:rPr b="1" lang="en-US" sz="2800" spc="-1" strike="noStrike">
-                  <a:solidFill>
-                    <a:srgbClr val="393939"/>
-                  </a:solidFill>
-                  <a:latin typeface="Gill Sans"/>
-                  <a:ea typeface="Arial"/>
-                </a:rPr>
-                <a:t>t</a:t>
-              </a:r>
-              <a:r>
-                <a:rPr b="1" lang="en-US" sz="2800" spc="-1" strike="noStrike">
-                  <a:solidFill>
-                    <a:srgbClr val="393939"/>
-                  </a:solidFill>
-                  <a:latin typeface="Gill Sans"/>
-                  <a:ea typeface="Arial"/>
-                </a:rPr>
-                <a:t>e</a:t>
+                <a:t>Coefficients: Hispanic Graduation Rate</a:t>
               </a:r>
               <a:endParaRPr b="0" lang="en-US" sz="2800" spc="-1" strike="noStrike">
                 <a:latin typeface="Arial"/>
@@ -4888,28 +4038,28 @@
       </p:grpSp>
       <p:grpSp>
         <p:nvGrpSpPr>
-          <p:cNvPr id="101" name="Group 35"/>
+          <p:cNvPr id="91" name="Group 30"/>
           <p:cNvGrpSpPr/>
           <p:nvPr/>
         </p:nvGrpSpPr>
         <p:grpSpPr>
           <a:xfrm>
             <a:off x="33284160" y="5669280"/>
-            <a:ext cx="10115280" cy="10717920"/>
+            <a:ext cx="10114920" cy="10717560"/>
             <a:chOff x="33284160" y="5669280"/>
-            <a:chExt cx="10115280" cy="10717920"/>
+            <a:chExt cx="10114920" cy="10717560"/>
           </a:xfrm>
         </p:grpSpPr>
         <p:sp>
           <p:nvSpPr>
-            <p:cNvPr id="102" name="CustomShape 36"/>
+            <p:cNvPr id="92" name="CustomShape 31"/>
             <p:cNvSpPr/>
             <p:nvPr/>
           </p:nvSpPr>
           <p:spPr>
             <a:xfrm>
               <a:off x="35478720" y="5669280"/>
-              <a:ext cx="6949080" cy="597960"/>
+              <a:ext cx="6948720" cy="597600"/>
             </a:xfrm>
             <a:prstGeom prst="rect">
               <a:avLst/>
@@ -4956,19 +4106,298 @@
         </p:sp>
         <p:pic>
           <p:nvPicPr>
-            <p:cNvPr id="103" name="" descr=""/>
+            <p:cNvPr id="93" name="" descr=""/>
             <p:cNvPicPr/>
             <p:nvPr/>
           </p:nvPicPr>
           <p:blipFill>
-            <a:blip r:embed="rId20"/>
+            <a:blip r:embed="rId17"/>
             <a:srcRect l="0" t="3571" r="0" b="0"/>
             <a:stretch/>
           </p:blipFill>
           <p:spPr>
             <a:xfrm>
               <a:off x="33284160" y="6511680"/>
-              <a:ext cx="10115280" cy="9875520"/>
+              <a:ext cx="10114920" cy="9875160"/>
+            </a:xfrm>
+            <a:prstGeom prst="rect">
+              <a:avLst/>
+            </a:prstGeom>
+            <a:ln>
+              <a:noFill/>
+            </a:ln>
+          </p:spPr>
+        </p:pic>
+      </p:grpSp>
+      <p:grpSp>
+        <p:nvGrpSpPr>
+          <p:cNvPr id="94" name="Group 32"/>
+          <p:cNvGrpSpPr/>
+          <p:nvPr/>
+        </p:nvGrpSpPr>
+        <p:grpSpPr>
+          <a:xfrm>
+            <a:off x="10885680" y="19571040"/>
+            <a:ext cx="10877040" cy="5896080"/>
+            <a:chOff x="10885680" y="19571040"/>
+            <a:chExt cx="10877040" cy="5896080"/>
+          </a:xfrm>
+        </p:grpSpPr>
+        <p:sp>
+          <p:nvSpPr>
+            <p:cNvPr id="95" name="CustomShape 33"/>
+            <p:cNvSpPr/>
+            <p:nvPr/>
+          </p:nvSpPr>
+          <p:spPr>
+            <a:xfrm>
+              <a:off x="13529160" y="19571040"/>
+              <a:ext cx="5785200" cy="597600"/>
+            </a:xfrm>
+            <a:prstGeom prst="rect">
+              <a:avLst/>
+            </a:prstGeom>
+            <a:noFill/>
+            <a:ln>
+              <a:noFill/>
+            </a:ln>
+          </p:spPr>
+          <p:style>
+            <a:lnRef idx="0"/>
+            <a:fillRef idx="0"/>
+            <a:effectRef idx="0"/>
+            <a:fontRef idx="minor"/>
+          </p:style>
+          <p:txBody>
+            <a:bodyPr lIns="171360" rIns="171360" tIns="85680" bIns="85680">
+              <a:spAutoFit/>
+            </a:bodyPr>
+            <a:p>
+              <a:pPr>
+                <a:lnSpc>
+                  <a:spcPct val="100000"/>
+                </a:lnSpc>
+                <a:spcBef>
+                  <a:spcPts val="2100"/>
+                </a:spcBef>
+              </a:pPr>
+              <a:r>
+                <a:rPr b="1" lang="en-US" sz="2800" spc="-1" strike="noStrike">
+                  <a:solidFill>
+                    <a:srgbClr val="393939"/>
+                  </a:solidFill>
+                  <a:latin typeface="Gill Sans"/>
+                  <a:ea typeface="Arial"/>
+                </a:rPr>
+                <a:t>Partial Dependence Plots</a:t>
+              </a:r>
+              <a:endParaRPr b="0" lang="en-US" sz="2800" spc="-1" strike="noStrike">
+                <a:latin typeface="Arial"/>
+              </a:endParaRPr>
+            </a:p>
+          </p:txBody>
+        </p:sp>
+        <p:pic>
+          <p:nvPicPr>
+            <p:cNvPr id="96" name="" descr=""/>
+            <p:cNvPicPr/>
+            <p:nvPr/>
+          </p:nvPicPr>
+          <p:blipFill>
+            <a:blip r:embed="rId18"/>
+            <a:srcRect l="0" t="0" r="0" b="50889"/>
+            <a:stretch/>
+          </p:blipFill>
+          <p:spPr>
+            <a:xfrm>
+              <a:off x="10885680" y="20130480"/>
+              <a:ext cx="10877040" cy="5336640"/>
+            </a:xfrm>
+            <a:prstGeom prst="rect">
+              <a:avLst/>
+            </a:prstGeom>
+            <a:ln>
+              <a:noFill/>
+            </a:ln>
+          </p:spPr>
+        </p:pic>
+      </p:grpSp>
+      <p:grpSp>
+        <p:nvGrpSpPr>
+          <p:cNvPr id="97" name="Group 34"/>
+          <p:cNvGrpSpPr/>
+          <p:nvPr/>
+        </p:nvGrpSpPr>
+        <p:grpSpPr>
+          <a:xfrm>
+            <a:off x="22393800" y="5760720"/>
+            <a:ext cx="10250280" cy="5763960"/>
+            <a:chOff x="22393800" y="5760720"/>
+            <a:chExt cx="10250280" cy="5763960"/>
+          </a:xfrm>
+        </p:grpSpPr>
+        <p:sp>
+          <p:nvSpPr>
+            <p:cNvPr id="98" name="CustomShape 35"/>
+            <p:cNvSpPr/>
+            <p:nvPr/>
+          </p:nvSpPr>
+          <p:spPr>
+            <a:xfrm>
+              <a:off x="24916320" y="5760720"/>
+              <a:ext cx="5685120" cy="597600"/>
+            </a:xfrm>
+            <a:prstGeom prst="rect">
+              <a:avLst/>
+            </a:prstGeom>
+            <a:noFill/>
+            <a:ln>
+              <a:noFill/>
+            </a:ln>
+          </p:spPr>
+          <p:style>
+            <a:lnRef idx="0"/>
+            <a:fillRef idx="0"/>
+            <a:effectRef idx="0"/>
+            <a:fontRef idx="minor"/>
+          </p:style>
+          <p:txBody>
+            <a:bodyPr lIns="171360" rIns="171360" tIns="85680" bIns="85680">
+              <a:spAutoFit/>
+            </a:bodyPr>
+            <a:p>
+              <a:pPr>
+                <a:lnSpc>
+                  <a:spcPct val="100000"/>
+                </a:lnSpc>
+                <a:spcBef>
+                  <a:spcPts val="2100"/>
+                </a:spcBef>
+              </a:pPr>
+              <a:r>
+                <a:rPr b="1" lang="en-US" sz="2800" spc="-1" strike="noStrike">
+                  <a:solidFill>
+                    <a:srgbClr val="393939"/>
+                  </a:solidFill>
+                  <a:latin typeface="Gill Sans"/>
+                  <a:ea typeface="Arial"/>
+                </a:rPr>
+                <a:t>Partial Dependence Plots</a:t>
+              </a:r>
+              <a:endParaRPr b="0" lang="en-US" sz="2800" spc="-1" strike="noStrike">
+                <a:latin typeface="Arial"/>
+              </a:endParaRPr>
+            </a:p>
+          </p:txBody>
+        </p:sp>
+        <p:pic>
+          <p:nvPicPr>
+            <p:cNvPr id="99" name="" descr=""/>
+            <p:cNvPicPr/>
+            <p:nvPr/>
+          </p:nvPicPr>
+          <p:blipFill>
+            <a:blip r:embed="rId19"/>
+            <a:srcRect l="0" t="49707" r="0" b="291"/>
+            <a:stretch/>
+          </p:blipFill>
+          <p:spPr>
+            <a:xfrm>
+              <a:off x="22393800" y="6404400"/>
+              <a:ext cx="10250280" cy="5120280"/>
+            </a:xfrm>
+            <a:prstGeom prst="rect">
+              <a:avLst/>
+            </a:prstGeom>
+            <a:ln>
+              <a:noFill/>
+            </a:ln>
+          </p:spPr>
+        </p:pic>
+      </p:grpSp>
+      <p:grpSp>
+        <p:nvGrpSpPr>
+          <p:cNvPr id="100" name="Group 36"/>
+          <p:cNvGrpSpPr/>
+          <p:nvPr/>
+        </p:nvGrpSpPr>
+        <p:grpSpPr>
+          <a:xfrm>
+            <a:off x="10972800" y="7863840"/>
+            <a:ext cx="10332720" cy="8037360"/>
+            <a:chOff x="10972800" y="7863840"/>
+            <a:chExt cx="10332720" cy="8037360"/>
+          </a:xfrm>
+        </p:grpSpPr>
+        <p:sp>
+          <p:nvSpPr>
+            <p:cNvPr id="101" name="CustomShape 37"/>
+            <p:cNvSpPr/>
+            <p:nvPr/>
+          </p:nvSpPr>
+          <p:spPr>
+            <a:xfrm>
+              <a:off x="13327920" y="7863840"/>
+              <a:ext cx="7039800" cy="597600"/>
+            </a:xfrm>
+            <a:prstGeom prst="rect">
+              <a:avLst/>
+            </a:prstGeom>
+            <a:noFill/>
+            <a:ln>
+              <a:noFill/>
+            </a:ln>
+          </p:spPr>
+          <p:style>
+            <a:lnRef idx="0"/>
+            <a:fillRef idx="0"/>
+            <a:effectRef idx="0"/>
+            <a:fontRef idx="minor"/>
+          </p:style>
+          <p:txBody>
+            <a:bodyPr lIns="171360" rIns="171360" tIns="85680" bIns="85680">
+              <a:spAutoFit/>
+            </a:bodyPr>
+            <a:p>
+              <a:pPr>
+                <a:lnSpc>
+                  <a:spcPct val="100000"/>
+                </a:lnSpc>
+                <a:spcBef>
+                  <a:spcPts val="2100"/>
+                </a:spcBef>
+              </a:pPr>
+              <a:r>
+                <a:rPr b="1" lang="en-US" sz="2800" spc="-1" strike="noStrike">
+                  <a:solidFill>
+                    <a:srgbClr val="393939"/>
+                  </a:solidFill>
+                  <a:latin typeface="Gill Sans"/>
+                  <a:ea typeface="Arial"/>
+                </a:rPr>
+                <a:t>Lasso Regression Coefficients</a:t>
+              </a:r>
+              <a:endParaRPr b="0" lang="en-US" sz="2800" spc="-1" strike="noStrike">
+                <a:latin typeface="Arial"/>
+              </a:endParaRPr>
+            </a:p>
+          </p:txBody>
+        </p:sp>
+        <p:pic>
+          <p:nvPicPr>
+            <p:cNvPr id="102" name="" descr=""/>
+            <p:cNvPicPr/>
+            <p:nvPr/>
+          </p:nvPicPr>
+          <p:blipFill>
+            <a:blip r:embed="rId20"/>
+            <a:srcRect l="0" t="0" r="9602" b="0"/>
+            <a:stretch/>
+          </p:blipFill>
+          <p:spPr>
+            <a:xfrm>
+              <a:off x="10972800" y="8367120"/>
+              <a:ext cx="10332720" cy="7534080"/>
             </a:xfrm>
             <a:prstGeom prst="rect">
               <a:avLst/>

</xml_diff>